<commit_message>
Upgrade PPT and ScreenShot
</commit_message>
<xml_diff>
--- a/제출 파일/OSS_Dr_Soldier.pptx
+++ b/제출 파일/OSS_Dr_Soldier.pptx
@@ -9,11 +9,12 @@
     <p:sldId id="260" r:id="rId3"/>
     <p:sldId id="259" r:id="rId4"/>
     <p:sldId id="265" r:id="rId5"/>
-    <p:sldId id="263" r:id="rId6"/>
-    <p:sldId id="266" r:id="rId7"/>
-    <p:sldId id="267" r:id="rId8"/>
-    <p:sldId id="268" r:id="rId9"/>
-    <p:sldId id="264" r:id="rId10"/>
+    <p:sldId id="269" r:id="rId6"/>
+    <p:sldId id="263" r:id="rId7"/>
+    <p:sldId id="266" r:id="rId8"/>
+    <p:sldId id="267" r:id="rId9"/>
+    <p:sldId id="268" r:id="rId10"/>
+    <p:sldId id="264" r:id="rId11"/>
   </p:sldIdLst>
   <p:sldSz cx="12192000" cy="6858000"/>
   <p:notesSz cx="6858000" cy="9144000"/>
@@ -4079,6 +4080,699 @@
 </p:sld>
 </file>
 
+<file path=ppt/slides/slide10.xml><?xml version="1.0" encoding="utf-8"?>
+<p:sld xmlns:a="http://schemas.openxmlformats.org/drawingml/2006/main" xmlns:r="http://schemas.openxmlformats.org/officeDocument/2006/relationships" xmlns:p="http://schemas.openxmlformats.org/presentationml/2006/main">
+  <p:cSld>
+    <p:spTree>
+      <p:nvGrpSpPr>
+        <p:cNvPr id="1" name=""/>
+        <p:cNvGrpSpPr/>
+        <p:nvPr/>
+      </p:nvGrpSpPr>
+      <p:grpSpPr>
+        <a:xfrm>
+          <a:off x="0" y="0"/>
+          <a:ext cx="0" cy="0"/>
+          <a:chOff x="0" y="0"/>
+          <a:chExt cx="0" cy="0"/>
+        </a:xfrm>
+      </p:grpSpPr>
+      <p:grpSp>
+        <p:nvGrpSpPr>
+          <p:cNvPr id="3" name="그룹 2"/>
+          <p:cNvGrpSpPr/>
+          <p:nvPr/>
+        </p:nvGrpSpPr>
+        <p:grpSpPr>
+          <a:xfrm>
+            <a:off x="0" y="0"/>
+            <a:ext cx="12192000" cy="6858000"/>
+            <a:chOff x="0" y="0"/>
+            <a:chExt cx="12192000" cy="6858000"/>
+          </a:xfrm>
+        </p:grpSpPr>
+        <p:grpSp>
+          <p:nvGrpSpPr>
+            <p:cNvPr id="2" name="그룹 1"/>
+            <p:cNvGrpSpPr/>
+            <p:nvPr/>
+          </p:nvGrpSpPr>
+          <p:grpSpPr>
+            <a:xfrm>
+              <a:off x="0" y="0"/>
+              <a:ext cx="12192000" cy="6858000"/>
+              <a:chOff x="0" y="0"/>
+              <a:chExt cx="12192000" cy="6858000"/>
+            </a:xfrm>
+          </p:grpSpPr>
+          <p:sp>
+            <p:nvSpPr>
+              <p:cNvPr id="14" name="자유형 13"/>
+              <p:cNvSpPr/>
+              <p:nvPr/>
+            </p:nvSpPr>
+            <p:spPr>
+              <a:xfrm>
+                <a:off x="0" y="0"/>
+                <a:ext cx="12192000" cy="6858000"/>
+              </a:xfrm>
+              <a:custGeom>
+                <a:avLst/>
+                <a:gdLst>
+                  <a:gd name="connsiteX0" fmla="*/ 545986 w 12192000"/>
+                  <a:gd name="connsiteY0" fmla="*/ 789920 h 6858000"/>
+                  <a:gd name="connsiteX1" fmla="*/ 545986 w 12192000"/>
+                  <a:gd name="connsiteY1" fmla="*/ 6572570 h 6858000"/>
+                  <a:gd name="connsiteX2" fmla="*/ 11747500 w 12192000"/>
+                  <a:gd name="connsiteY2" fmla="*/ 6572570 h 6858000"/>
+                  <a:gd name="connsiteX3" fmla="*/ 11747500 w 12192000"/>
+                  <a:gd name="connsiteY3" fmla="*/ 789920 h 6858000"/>
+                  <a:gd name="connsiteX4" fmla="*/ 0 w 12192000"/>
+                  <a:gd name="connsiteY4" fmla="*/ 0 h 6858000"/>
+                  <a:gd name="connsiteX5" fmla="*/ 12192000 w 12192000"/>
+                  <a:gd name="connsiteY5" fmla="*/ 0 h 6858000"/>
+                  <a:gd name="connsiteX6" fmla="*/ 12192000 w 12192000"/>
+                  <a:gd name="connsiteY6" fmla="*/ 6858000 h 6858000"/>
+                  <a:gd name="connsiteX7" fmla="*/ 0 w 12192000"/>
+                  <a:gd name="connsiteY7" fmla="*/ 6858000 h 6858000"/>
+                </a:gdLst>
+                <a:ahLst/>
+                <a:cxnLst>
+                  <a:cxn ang="0">
+                    <a:pos x="connsiteX0" y="connsiteY0"/>
+                  </a:cxn>
+                  <a:cxn ang="0">
+                    <a:pos x="connsiteX1" y="connsiteY1"/>
+                  </a:cxn>
+                  <a:cxn ang="0">
+                    <a:pos x="connsiteX2" y="connsiteY2"/>
+                  </a:cxn>
+                  <a:cxn ang="0">
+                    <a:pos x="connsiteX3" y="connsiteY3"/>
+                  </a:cxn>
+                  <a:cxn ang="0">
+                    <a:pos x="connsiteX4" y="connsiteY4"/>
+                  </a:cxn>
+                  <a:cxn ang="0">
+                    <a:pos x="connsiteX5" y="connsiteY5"/>
+                  </a:cxn>
+                  <a:cxn ang="0">
+                    <a:pos x="connsiteX6" y="connsiteY6"/>
+                  </a:cxn>
+                  <a:cxn ang="0">
+                    <a:pos x="connsiteX7" y="connsiteY7"/>
+                  </a:cxn>
+                </a:cxnLst>
+                <a:rect l="l" t="t" r="r" b="b"/>
+                <a:pathLst>
+                  <a:path w="12192000" h="6858000">
+                    <a:moveTo>
+                      <a:pt x="545986" y="789920"/>
+                    </a:moveTo>
+                    <a:lnTo>
+                      <a:pt x="545986" y="6572570"/>
+                    </a:lnTo>
+                    <a:lnTo>
+                      <a:pt x="11747500" y="6572570"/>
+                    </a:lnTo>
+                    <a:lnTo>
+                      <a:pt x="11747500" y="789920"/>
+                    </a:lnTo>
+                    <a:close/>
+                    <a:moveTo>
+                      <a:pt x="0" y="0"/>
+                    </a:moveTo>
+                    <a:lnTo>
+                      <a:pt x="12192000" y="0"/>
+                    </a:lnTo>
+                    <a:lnTo>
+                      <a:pt x="12192000" y="6858000"/>
+                    </a:lnTo>
+                    <a:lnTo>
+                      <a:pt x="0" y="6858000"/>
+                    </a:lnTo>
+                    <a:close/>
+                  </a:path>
+                </a:pathLst>
+              </a:custGeom>
+              <a:solidFill>
+                <a:srgbClr val="47A3F8"/>
+              </a:solidFill>
+              <a:ln>
+                <a:noFill/>
+              </a:ln>
+            </p:spPr>
+            <p:style>
+              <a:lnRef idx="2">
+                <a:schemeClr val="accent1">
+                  <a:shade val="50000"/>
+                </a:schemeClr>
+              </a:lnRef>
+              <a:fillRef idx="1">
+                <a:schemeClr val="accent1"/>
+              </a:fillRef>
+              <a:effectRef idx="0">
+                <a:schemeClr val="accent1"/>
+              </a:effectRef>
+              <a:fontRef idx="minor">
+                <a:schemeClr val="lt1"/>
+              </a:fontRef>
+            </p:style>
+            <p:txBody>
+              <a:bodyPr rtlCol="0" anchor="ctr"/>
+              <a:lstStyle/>
+              <a:p>
+                <a:pPr algn="ctr"/>
+                <a:endParaRPr lang="ko-KR" altLang="en-US">
+                  <a:solidFill>
+                    <a:prstClr val="white"/>
+                  </a:solidFill>
+                </a:endParaRPr>
+              </a:p>
+            </p:txBody>
+          </p:sp>
+          <p:sp>
+            <p:nvSpPr>
+              <p:cNvPr id="15" name="자유형 14"/>
+              <p:cNvSpPr/>
+              <p:nvPr/>
+            </p:nvSpPr>
+            <p:spPr>
+              <a:xfrm flipH="1" flipV="1">
+                <a:off x="0" y="2636119"/>
+                <a:ext cx="12192000" cy="4221881"/>
+              </a:xfrm>
+              <a:custGeom>
+                <a:avLst/>
+                <a:gdLst>
+                  <a:gd name="connsiteX0" fmla="*/ 444500 w 12192000"/>
+                  <a:gd name="connsiteY0" fmla="*/ 4221881 h 4221881"/>
+                  <a:gd name="connsiteX1" fmla="*/ 0 w 12192000"/>
+                  <a:gd name="connsiteY1" fmla="*/ 4078586 h 4221881"/>
+                  <a:gd name="connsiteX2" fmla="*/ 0 w 12192000"/>
+                  <a:gd name="connsiteY2" fmla="*/ 0 h 4221881"/>
+                  <a:gd name="connsiteX3" fmla="*/ 12192000 w 12192000"/>
+                  <a:gd name="connsiteY3" fmla="*/ 0 h 4221881"/>
+                  <a:gd name="connsiteX4" fmla="*/ 12192000 w 12192000"/>
+                  <a:gd name="connsiteY4" fmla="*/ 2508406 h 4221881"/>
+                  <a:gd name="connsiteX5" fmla="*/ 11756238 w 12192000"/>
+                  <a:gd name="connsiteY5" fmla="*/ 2514772 h 4221881"/>
+                  <a:gd name="connsiteX6" fmla="*/ 11646014 w 12192000"/>
+                  <a:gd name="connsiteY6" fmla="*/ 2519700 h 4221881"/>
+                  <a:gd name="connsiteX7" fmla="*/ 11646014 w 12192000"/>
+                  <a:gd name="connsiteY7" fmla="*/ 285430 h 4221881"/>
+                  <a:gd name="connsiteX8" fmla="*/ 444500 w 12192000"/>
+                  <a:gd name="connsiteY8" fmla="*/ 285430 h 4221881"/>
+                </a:gdLst>
+                <a:ahLst/>
+                <a:cxnLst>
+                  <a:cxn ang="0">
+                    <a:pos x="connsiteX0" y="connsiteY0"/>
+                  </a:cxn>
+                  <a:cxn ang="0">
+                    <a:pos x="connsiteX1" y="connsiteY1"/>
+                  </a:cxn>
+                  <a:cxn ang="0">
+                    <a:pos x="connsiteX2" y="connsiteY2"/>
+                  </a:cxn>
+                  <a:cxn ang="0">
+                    <a:pos x="connsiteX3" y="connsiteY3"/>
+                  </a:cxn>
+                  <a:cxn ang="0">
+                    <a:pos x="connsiteX4" y="connsiteY4"/>
+                  </a:cxn>
+                  <a:cxn ang="0">
+                    <a:pos x="connsiteX5" y="connsiteY5"/>
+                  </a:cxn>
+                  <a:cxn ang="0">
+                    <a:pos x="connsiteX6" y="connsiteY6"/>
+                  </a:cxn>
+                  <a:cxn ang="0">
+                    <a:pos x="connsiteX7" y="connsiteY7"/>
+                  </a:cxn>
+                  <a:cxn ang="0">
+                    <a:pos x="connsiteX8" y="connsiteY8"/>
+                  </a:cxn>
+                </a:cxnLst>
+                <a:rect l="l" t="t" r="r" b="b"/>
+                <a:pathLst>
+                  <a:path w="12192000" h="4221881">
+                    <a:moveTo>
+                      <a:pt x="444500" y="4221881"/>
+                    </a:moveTo>
+                    <a:lnTo>
+                      <a:pt x="0" y="4078586"/>
+                    </a:lnTo>
+                    <a:lnTo>
+                      <a:pt x="0" y="0"/>
+                    </a:lnTo>
+                    <a:lnTo>
+                      <a:pt x="12192000" y="0"/>
+                    </a:lnTo>
+                    <a:lnTo>
+                      <a:pt x="12192000" y="2508406"/>
+                    </a:lnTo>
+                    <a:cubicBezTo>
+                      <a:pt x="12043172" y="2508406"/>
+                      <a:pt x="11897977" y="2510574"/>
+                      <a:pt x="11756238" y="2514772"/>
+                    </a:cubicBezTo>
+                    <a:lnTo>
+                      <a:pt x="11646014" y="2519700"/>
+                    </a:lnTo>
+                    <a:lnTo>
+                      <a:pt x="11646014" y="285430"/>
+                    </a:lnTo>
+                    <a:lnTo>
+                      <a:pt x="444500" y="285430"/>
+                    </a:lnTo>
+                    <a:close/>
+                  </a:path>
+                </a:pathLst>
+              </a:custGeom>
+              <a:solidFill>
+                <a:srgbClr val="B2E1FD"/>
+              </a:solidFill>
+              <a:ln>
+                <a:noFill/>
+              </a:ln>
+            </p:spPr>
+            <p:style>
+              <a:lnRef idx="2">
+                <a:schemeClr val="accent1">
+                  <a:shade val="50000"/>
+                </a:schemeClr>
+              </a:lnRef>
+              <a:fillRef idx="1">
+                <a:schemeClr val="accent1"/>
+              </a:fillRef>
+              <a:effectRef idx="0">
+                <a:schemeClr val="accent1"/>
+              </a:effectRef>
+              <a:fontRef idx="minor">
+                <a:schemeClr val="lt1"/>
+              </a:fontRef>
+            </p:style>
+            <p:txBody>
+              <a:bodyPr rtlCol="0" anchor="ctr"/>
+              <a:lstStyle/>
+              <a:p>
+                <a:pPr algn="ctr"/>
+                <a:endParaRPr lang="ko-KR" altLang="en-US">
+                  <a:solidFill>
+                    <a:prstClr val="white"/>
+                  </a:solidFill>
+                </a:endParaRPr>
+              </a:p>
+            </p:txBody>
+          </p:sp>
+          <p:cxnSp>
+            <p:nvCxnSpPr>
+              <p:cNvPr id="16" name="직선 연결선 15"/>
+              <p:cNvCxnSpPr/>
+              <p:nvPr/>
+            </p:nvCxnSpPr>
+            <p:spPr>
+              <a:xfrm rot="16200000">
+                <a:off x="1445986" y="-492125"/>
+                <a:ext cx="0" cy="1800000"/>
+              </a:xfrm>
+              <a:prstGeom prst="line">
+                <a:avLst/>
+              </a:prstGeom>
+              <a:ln>
+                <a:solidFill>
+                  <a:schemeClr val="bg1"/>
+                </a:solidFill>
+              </a:ln>
+            </p:spPr>
+            <p:style>
+              <a:lnRef idx="1">
+                <a:schemeClr val="accent1"/>
+              </a:lnRef>
+              <a:fillRef idx="0">
+                <a:schemeClr val="accent1"/>
+              </a:fillRef>
+              <a:effectRef idx="0">
+                <a:schemeClr val="accent1"/>
+              </a:effectRef>
+              <a:fontRef idx="minor">
+                <a:schemeClr val="tx1"/>
+              </a:fontRef>
+            </p:style>
+          </p:cxnSp>
+        </p:grpSp>
+        <p:cxnSp>
+          <p:nvCxnSpPr>
+            <p:cNvPr id="18" name="직선 연결선 17"/>
+            <p:cNvCxnSpPr/>
+            <p:nvPr/>
+          </p:nvCxnSpPr>
+          <p:spPr>
+            <a:xfrm rot="16200000">
+              <a:off x="10847500" y="5786550"/>
+              <a:ext cx="0" cy="1800000"/>
+            </a:xfrm>
+            <a:prstGeom prst="line">
+              <a:avLst/>
+            </a:prstGeom>
+            <a:ln>
+              <a:solidFill>
+                <a:schemeClr val="bg1"/>
+              </a:solidFill>
+            </a:ln>
+          </p:spPr>
+          <p:style>
+            <a:lnRef idx="1">
+              <a:schemeClr val="accent1"/>
+            </a:lnRef>
+            <a:fillRef idx="0">
+              <a:schemeClr val="accent1"/>
+            </a:fillRef>
+            <a:effectRef idx="0">
+              <a:schemeClr val="accent1"/>
+            </a:effectRef>
+            <a:fontRef idx="minor">
+              <a:schemeClr val="tx1"/>
+            </a:fontRef>
+          </p:style>
+        </p:cxnSp>
+      </p:grpSp>
+      <p:cxnSp>
+        <p:nvCxnSpPr>
+          <p:cNvPr id="13" name="직선 연결선 12"/>
+          <p:cNvCxnSpPr/>
+          <p:nvPr/>
+        </p:nvCxnSpPr>
+        <p:spPr>
+          <a:xfrm rot="16200000">
+            <a:off x="1445986" y="-479425"/>
+            <a:ext cx="0" cy="1800000"/>
+          </a:xfrm>
+          <a:prstGeom prst="line">
+            <a:avLst/>
+          </a:prstGeom>
+          <a:ln>
+            <a:solidFill>
+              <a:schemeClr val="bg1"/>
+            </a:solidFill>
+          </a:ln>
+        </p:spPr>
+        <p:style>
+          <a:lnRef idx="1">
+            <a:schemeClr val="accent1"/>
+          </a:lnRef>
+          <a:fillRef idx="0">
+            <a:schemeClr val="accent1"/>
+          </a:fillRef>
+          <a:effectRef idx="0">
+            <a:schemeClr val="accent1"/>
+          </a:effectRef>
+          <a:fontRef idx="minor">
+            <a:schemeClr val="tx1"/>
+          </a:fontRef>
+        </p:style>
+      </p:cxnSp>
+      <p:cxnSp>
+        <p:nvCxnSpPr>
+          <p:cNvPr id="12" name="직선 연결선 11"/>
+          <p:cNvCxnSpPr/>
+          <p:nvPr/>
+        </p:nvCxnSpPr>
+        <p:spPr>
+          <a:xfrm rot="16200000">
+            <a:off x="10796700" y="5697650"/>
+            <a:ext cx="0" cy="1800000"/>
+          </a:xfrm>
+          <a:prstGeom prst="line">
+            <a:avLst/>
+          </a:prstGeom>
+          <a:ln>
+            <a:solidFill>
+              <a:schemeClr val="bg1"/>
+            </a:solidFill>
+          </a:ln>
+        </p:spPr>
+        <p:style>
+          <a:lnRef idx="1">
+            <a:schemeClr val="accent1"/>
+          </a:lnRef>
+          <a:fillRef idx="0">
+            <a:schemeClr val="accent1"/>
+          </a:fillRef>
+          <a:effectRef idx="0">
+            <a:schemeClr val="accent1"/>
+          </a:effectRef>
+          <a:fontRef idx="minor">
+            <a:schemeClr val="tx1"/>
+          </a:fontRef>
+        </p:style>
+      </p:cxnSp>
+      <p:sp>
+        <p:nvSpPr>
+          <p:cNvPr id="22" name="직사각형 21"/>
+          <p:cNvSpPr/>
+          <p:nvPr/>
+        </p:nvSpPr>
+        <p:spPr>
+          <a:xfrm>
+            <a:off x="661248" y="4546755"/>
+            <a:ext cx="11201514" cy="769441"/>
+          </a:xfrm>
+          <a:prstGeom prst="rect">
+            <a:avLst/>
+          </a:prstGeom>
+        </p:spPr>
+        <p:txBody>
+          <a:bodyPr wrap="square">
+            <a:spAutoFit/>
+          </a:bodyPr>
+          <a:lstStyle/>
+          <a:p>
+            <a:pPr algn="ctr"/>
+            <a:r>
+              <a:rPr lang="ko-KR" altLang="en-US" sz="3200" b="1" kern="0" dirty="0" smtClean="0">
+                <a:solidFill>
+                  <a:prstClr val="black">
+                    <a:lumMod val="75000"/>
+                    <a:lumOff val="25000"/>
+                  </a:prstClr>
+                </a:solidFill>
+              </a:rPr>
+              <a:t>감사합니다</a:t>
+            </a:r>
+            <a:endParaRPr lang="en-US" altLang="ko-KR" sz="3200" b="1" kern="0" dirty="0">
+              <a:solidFill>
+                <a:prstClr val="black">
+                  <a:lumMod val="75000"/>
+                  <a:lumOff val="25000"/>
+                </a:prstClr>
+              </a:solidFill>
+            </a:endParaRPr>
+          </a:p>
+          <a:p>
+            <a:endParaRPr lang="en-US" altLang="ko-KR" sz="1200" b="1" kern="0" dirty="0">
+              <a:solidFill>
+                <a:prstClr val="black">
+                  <a:lumMod val="75000"/>
+                  <a:lumOff val="25000"/>
+                </a:prstClr>
+              </a:solidFill>
+            </a:endParaRPr>
+          </a:p>
+        </p:txBody>
+      </p:sp>
+      <p:pic>
+        <p:nvPicPr>
+          <p:cNvPr id="2050" name="Picture 2" descr="무지 꾸벅에 대한 이미지 검색결과"/>
+          <p:cNvPicPr>
+            <a:picLocks noChangeAspect="1" noChangeArrowheads="1"/>
+          </p:cNvPicPr>
+          <p:nvPr/>
+        </p:nvPicPr>
+        <p:blipFill>
+          <a:blip r:embed="rId2">
+            <a:extLst>
+              <a:ext uri="{28A0092B-C50C-407E-A947-70E740481C1C}">
+                <a14:useLocalDpi xmlns:a14="http://schemas.microsoft.com/office/drawing/2010/main" val="0"/>
+              </a:ext>
+            </a:extLst>
+          </a:blip>
+          <a:srcRect/>
+          <a:stretch>
+            <a:fillRect/>
+          </a:stretch>
+        </p:blipFill>
+        <p:spPr bwMode="auto">
+          <a:xfrm>
+            <a:off x="4622744" y="1754052"/>
+            <a:ext cx="3048000" cy="2495551"/>
+          </a:xfrm>
+          <a:prstGeom prst="rect">
+            <a:avLst/>
+          </a:prstGeom>
+          <a:noFill/>
+          <a:extLst>
+            <a:ext uri="{909E8E84-426E-40DD-AFC4-6F175D3DCCD1}">
+              <a14:hiddenFill xmlns:a14="http://schemas.microsoft.com/office/drawing/2010/main">
+                <a:solidFill>
+                  <a:srgbClr val="FFFFFF"/>
+                </a:solidFill>
+              </a14:hiddenFill>
+            </a:ext>
+          </a:extLst>
+        </p:spPr>
+      </p:pic>
+      <p:sp>
+        <p:nvSpPr>
+          <p:cNvPr id="17" name="직사각형 16"/>
+          <p:cNvSpPr/>
+          <p:nvPr/>
+        </p:nvSpPr>
+        <p:spPr>
+          <a:xfrm>
+            <a:off x="2286388" y="3362064"/>
+            <a:ext cx="7951233" cy="1384995"/>
+          </a:xfrm>
+          <a:prstGeom prst="rect">
+            <a:avLst/>
+          </a:prstGeom>
+        </p:spPr>
+        <p:txBody>
+          <a:bodyPr wrap="square">
+            <a:spAutoFit/>
+          </a:bodyPr>
+          <a:lstStyle/>
+          <a:p>
+            <a:endParaRPr lang="en-US" altLang="ko-KR" b="1" kern="0" dirty="0" smtClean="0">
+              <a:solidFill>
+                <a:prstClr val="black">
+                  <a:lumMod val="75000"/>
+                  <a:lumOff val="25000"/>
+                </a:prstClr>
+              </a:solidFill>
+            </a:endParaRPr>
+          </a:p>
+          <a:p>
+            <a:endParaRPr lang="en-US" altLang="ko-KR" b="1" kern="0" dirty="0" smtClean="0">
+              <a:solidFill>
+                <a:prstClr val="black">
+                  <a:lumMod val="75000"/>
+                  <a:lumOff val="25000"/>
+                </a:prstClr>
+              </a:solidFill>
+            </a:endParaRPr>
+          </a:p>
+          <a:p>
+            <a:endParaRPr lang="en-US" altLang="ko-KR" b="1" kern="0" dirty="0" smtClean="0">
+              <a:solidFill>
+                <a:prstClr val="black">
+                  <a:lumMod val="75000"/>
+                  <a:lumOff val="25000"/>
+                </a:prstClr>
+              </a:solidFill>
+            </a:endParaRPr>
+          </a:p>
+          <a:p>
+            <a:r>
+              <a:rPr lang="ko-KR" altLang="en-US" b="1" kern="0" dirty="0" smtClean="0">
+                <a:solidFill>
+                  <a:prstClr val="black">
+                    <a:lumMod val="75000"/>
+                    <a:lumOff val="25000"/>
+                  </a:prstClr>
+                </a:solidFill>
+              </a:rPr>
+              <a:t>   </a:t>
+            </a:r>
+            <a:r>
+              <a:rPr lang="ko-KR" altLang="en-US" b="1" kern="0" dirty="0" smtClean="0">
+                <a:solidFill>
+                  <a:prstClr val="black">
+                    <a:lumMod val="75000"/>
+                    <a:lumOff val="25000"/>
+                  </a:prstClr>
+                </a:solidFill>
+              </a:rPr>
+              <a:t>그 외 프로젝트에 관한 자세한 정보는 </a:t>
+            </a:r>
+            <a:r>
+              <a:rPr lang="en-US" altLang="ko-KR" b="1" kern="0" dirty="0" smtClean="0">
+                <a:solidFill>
+                  <a:prstClr val="black">
+                    <a:lumMod val="75000"/>
+                    <a:lumOff val="25000"/>
+                  </a:prstClr>
+                </a:solidFill>
+              </a:rPr>
+              <a:t>README.md </a:t>
+            </a:r>
+            <a:r>
+              <a:rPr lang="ko-KR" altLang="en-US" b="1" kern="0" dirty="0" smtClean="0">
+                <a:solidFill>
+                  <a:prstClr val="black">
+                    <a:lumMod val="75000"/>
+                    <a:lumOff val="25000"/>
+                  </a:prstClr>
+                </a:solidFill>
+              </a:rPr>
+              <a:t>파일에 있습니다</a:t>
+            </a:r>
+            <a:r>
+              <a:rPr lang="en-US" altLang="ko-KR" b="1" kern="0" dirty="0" smtClean="0">
+                <a:solidFill>
+                  <a:prstClr val="black">
+                    <a:lumMod val="75000"/>
+                    <a:lumOff val="25000"/>
+                  </a:prstClr>
+                </a:solidFill>
+              </a:rPr>
+              <a:t>.</a:t>
+            </a:r>
+            <a:endParaRPr lang="en-US" altLang="ko-KR" sz="1200" b="1" kern="0" dirty="0">
+              <a:solidFill>
+                <a:prstClr val="black">
+                  <a:lumMod val="75000"/>
+                  <a:lumOff val="25000"/>
+                </a:prstClr>
+              </a:solidFill>
+            </a:endParaRPr>
+          </a:p>
+          <a:p>
+            <a:endParaRPr lang="en-US" altLang="ko-KR" sz="1200" b="1" kern="0" dirty="0">
+              <a:solidFill>
+                <a:prstClr val="black">
+                  <a:lumMod val="75000"/>
+                  <a:lumOff val="25000"/>
+                </a:prstClr>
+              </a:solidFill>
+            </a:endParaRPr>
+          </a:p>
+        </p:txBody>
+      </p:sp>
+    </p:spTree>
+    <p:extLst>
+      <p:ext uri="{BB962C8B-B14F-4D97-AF65-F5344CB8AC3E}">
+        <p14:creationId xmlns:p14="http://schemas.microsoft.com/office/powerpoint/2010/main" val="3767119247"/>
+      </p:ext>
+    </p:extLst>
+  </p:cSld>
+  <p:clrMapOvr>
+    <a:masterClrMapping/>
+  </p:clrMapOvr>
+  <p:transition spd="slow">
+    <p:push dir="u"/>
+  </p:transition>
+  <p:timing>
+    <p:tnLst>
+      <p:par>
+        <p:cTn id="1" dur="indefinite" restart="never" nodeType="tmRoot"/>
+      </p:par>
+    </p:tnLst>
+  </p:timing>
+</p:sld>
+</file>
+
 <file path=ppt/slides/slide2.xml><?xml version="1.0" encoding="utf-8"?>
 <p:sld xmlns:a="http://schemas.openxmlformats.org/drawingml/2006/main" xmlns:r="http://schemas.openxmlformats.org/officeDocument/2006/relationships" xmlns:p="http://schemas.openxmlformats.org/presentationml/2006/main">
   <p:cSld>
@@ -4916,7 +5610,7 @@
           <p:cNvPr id="42" name="직사각형 41">
             <a:extLst>
               <a:ext uri="{FF2B5EF4-FFF2-40B4-BE49-F238E27FC236}">
-                <a16:creationId xmlns:a16="http://schemas.microsoft.com/office/drawing/2014/main" xmlns="" id="{3FA00699-5178-465A-9F3F-130CF1431F70}"/>
+                <a16:creationId xmlns="" xmlns:a16="http://schemas.microsoft.com/office/drawing/2014/main" id="{3FA00699-5178-465A-9F3F-130CF1431F70}"/>
               </a:ext>
             </a:extLst>
           </p:cNvPr>
@@ -6125,10 +6819,10 @@
                   </a:prstClr>
                 </a:solidFill>
               </a:rPr>
-              <a:t>Mobile </a:t>
-            </a:r>
-            <a:r>
-              <a:rPr lang="en-US" altLang="ko-KR" b="1" kern="0" dirty="0" smtClean="0">
+              <a:t>Mobile Application</a:t>
+            </a:r>
+            <a:r>
+              <a:rPr lang="ko-KR" altLang="en-US" b="1" kern="0" dirty="0">
                 <a:solidFill>
                   <a:prstClr val="black">
                     <a:lumMod val="75000"/>
@@ -6136,10 +6830,10 @@
                   </a:prstClr>
                 </a:solidFill>
               </a:rPr>
-              <a:t>Application</a:t>
-            </a:r>
-            <a:r>
-              <a:rPr lang="ko-KR" altLang="en-US" b="1" kern="0" dirty="0">
+              <a:t>도</a:t>
+            </a:r>
+            <a:r>
+              <a:rPr lang="ko-KR" altLang="en-US" b="1" kern="0" dirty="0" smtClean="0">
                 <a:solidFill>
                   <a:prstClr val="black">
                     <a:lumMod val="75000"/>
@@ -6147,29 +6841,7 @@
                   </a:prstClr>
                 </a:solidFill>
               </a:rPr>
-              <a:t>도</a:t>
-            </a:r>
-            <a:r>
-              <a:rPr lang="ko-KR" altLang="en-US" b="1" kern="0" dirty="0" smtClean="0">
-                <a:solidFill>
-                  <a:prstClr val="black">
-                    <a:lumMod val="75000"/>
-                    <a:lumOff val="25000"/>
-                  </a:prstClr>
-                </a:solidFill>
-              </a:rPr>
-              <a:t> </a:t>
-            </a:r>
-            <a:r>
-              <a:rPr lang="ko-KR" altLang="en-US" b="1" kern="0" dirty="0" smtClean="0">
-                <a:solidFill>
-                  <a:prstClr val="black">
-                    <a:lumMod val="75000"/>
-                    <a:lumOff val="25000"/>
-                  </a:prstClr>
-                </a:solidFill>
-              </a:rPr>
-              <a:t>만들 수 있게 되었습니다</a:t>
+              <a:t> 만들 수 있게 되었습니다</a:t>
             </a:r>
             <a:r>
               <a:rPr lang="en-US" altLang="ko-KR" b="1" kern="0" dirty="0" smtClean="0">
@@ -7143,18 +7815,7 @@
                   </a:prstClr>
                 </a:solidFill>
               </a:rPr>
-              <a:t>    </a:t>
-            </a:r>
-            <a:r>
-              <a:rPr lang="ko-KR" altLang="en-US" b="1" kern="0" dirty="0" smtClean="0">
-                <a:solidFill>
-                  <a:prstClr val="black">
-                    <a:lumMod val="75000"/>
-                    <a:lumOff val="25000"/>
-                  </a:prstClr>
-                </a:solidFill>
-              </a:rPr>
-              <a:t>닥터 </a:t>
+              <a:t>    닥터 </a:t>
             </a:r>
             <a:r>
               <a:rPr lang="ko-KR" altLang="en-US" b="1" kern="0" dirty="0" err="1" smtClean="0">
@@ -8184,15 +8845,7 @@
                   <a:prstClr val="white"/>
                 </a:solidFill>
               </a:rPr>
-              <a:t>기</a:t>
-            </a:r>
-            <a:r>
-              <a:rPr lang="ko-KR" altLang="en-US" sz="2800" b="1" i="1" dirty="0">
-                <a:solidFill>
-                  <a:prstClr val="white"/>
-                </a:solidFill>
-              </a:rPr>
-              <a:t>능</a:t>
+              <a:t>초기 화면 정의서</a:t>
             </a:r>
             <a:endParaRPr lang="en-US" altLang="ko-KR" sz="900" dirty="0">
               <a:solidFill>
@@ -8245,8 +8898,8 @@
         </p:nvSpPr>
         <p:spPr>
           <a:xfrm>
-            <a:off x="1222793" y="1008280"/>
-            <a:ext cx="1747594" cy="523220"/>
+            <a:off x="1222793" y="995289"/>
+            <a:ext cx="3818674" cy="523220"/>
           </a:xfrm>
           <a:prstGeom prst="rect">
             <a:avLst/>
@@ -8259,7 +8912,7 @@
           <a:lstStyle/>
           <a:p>
             <a:r>
-              <a:rPr lang="ko-KR" altLang="en-US" sz="2800" b="1" i="1" kern="0" dirty="0" smtClean="0">
+              <a:rPr lang="ko-KR" altLang="en-US" sz="2800" b="1" kern="0" dirty="0" smtClean="0">
                 <a:solidFill>
                   <a:prstClr val="black">
                     <a:lumMod val="75000"/>
@@ -8267,9 +8920,31 @@
                   </a:prstClr>
                 </a:solidFill>
               </a:rPr>
-              <a:t>기능 소개</a:t>
-            </a:r>
-            <a:endParaRPr lang="en-US" altLang="ko-KR" sz="2800" b="1" i="1" kern="0" dirty="0">
+              <a:t>닥터 </a:t>
+            </a:r>
+            <a:r>
+              <a:rPr lang="ko-KR" altLang="en-US" sz="2800" b="1" kern="0" dirty="0" err="1" smtClean="0">
+                <a:solidFill>
+                  <a:prstClr val="black">
+                    <a:lumMod val="75000"/>
+                    <a:lumOff val="25000"/>
+                  </a:prstClr>
+                </a:solidFill>
+              </a:rPr>
+              <a:t>솔저</a:t>
+            </a:r>
+            <a:r>
+              <a:rPr lang="en-US" altLang="ko-KR" sz="2800" b="1" kern="0" dirty="0" smtClean="0">
+                <a:solidFill>
+                  <a:prstClr val="black">
+                    <a:lumMod val="75000"/>
+                    <a:lumOff val="25000"/>
+                  </a:prstClr>
+                </a:solidFill>
+              </a:rPr>
+              <a:t>(Dr. Soldier)</a:t>
+            </a:r>
+            <a:endParaRPr lang="en-US" altLang="ko-KR" sz="2800" b="1" kern="0" dirty="0">
               <a:solidFill>
                 <a:prstClr val="black">
                   <a:lumMod val="75000"/>
@@ -8282,7 +8957,7 @@
       </p:sp>
       <p:pic>
         <p:nvPicPr>
-          <p:cNvPr id="4" name="Picture 2" descr="C:\Users\Admin\Downloads\K-002.png"/>
+          <p:cNvPr id="1026" name="Picture 2" descr="C:\Users\Admin\WEB_Dr.Soldier_Solo\제출 파일\초기구상.jpg"/>
           <p:cNvPicPr>
             <a:picLocks noChangeAspect="1" noChangeArrowheads="1"/>
           </p:cNvPicPr>
@@ -8303,8 +8978,8 @@
         </p:blipFill>
         <p:spPr bwMode="auto">
           <a:xfrm>
-            <a:off x="1682270" y="1623332"/>
-            <a:ext cx="2468658" cy="4400950"/>
+            <a:off x="3325730" y="1518509"/>
+            <a:ext cx="2644442" cy="4701230"/>
           </a:xfrm>
           <a:prstGeom prst="rect">
             <a:avLst/>
@@ -8321,326 +8996,226 @@
           </a:extLst>
         </p:spPr>
       </p:pic>
-      <p:pic>
-        <p:nvPicPr>
-          <p:cNvPr id="1027" name="Picture 3" descr="C:\Users\Admin\Downloads\K-005.png"/>
-          <p:cNvPicPr>
-            <a:picLocks noChangeAspect="1" noChangeArrowheads="1"/>
-          </p:cNvPicPr>
+      <p:sp>
+        <p:nvSpPr>
+          <p:cNvPr id="19" name="직사각형 18"/>
+          <p:cNvSpPr/>
           <p:nvPr/>
-        </p:nvPicPr>
-        <p:blipFill>
-          <a:blip r:embed="rId3">
-            <a:extLst>
-              <a:ext uri="{28A0092B-C50C-407E-A947-70E740481C1C}">
-                <a14:useLocalDpi xmlns:a14="http://schemas.microsoft.com/office/drawing/2010/main" val="0"/>
-              </a:ext>
-            </a:extLst>
-          </a:blip>
-          <a:srcRect/>
-          <a:stretch>
-            <a:fillRect/>
-          </a:stretch>
-        </p:blipFill>
-        <p:spPr bwMode="auto">
+        </p:nvSpPr>
+        <p:spPr>
           <a:xfrm>
-            <a:off x="6146742" y="1623332"/>
-            <a:ext cx="2469696" cy="4402800"/>
+            <a:off x="6096000" y="1518509"/>
+            <a:ext cx="2861501" cy="646331"/>
           </a:xfrm>
           <a:prstGeom prst="rect">
             <a:avLst/>
           </a:prstGeom>
-          <a:noFill/>
-          <a:extLst>
-            <a:ext uri="{909E8E84-426E-40DD-AFC4-6F175D3DCCD1}">
-              <a14:hiddenFill xmlns:a14="http://schemas.microsoft.com/office/drawing/2010/main">
-                <a:solidFill>
-                  <a:srgbClr val="FFFFFF"/>
-                </a:solidFill>
-              </a14:hiddenFill>
-            </a:ext>
-          </a:extLst>
         </p:spPr>
-      </p:pic>
+        <p:txBody>
+          <a:bodyPr wrap="square">
+            <a:spAutoFit/>
+          </a:bodyPr>
+          <a:lstStyle/>
+          <a:p>
+            <a:endParaRPr lang="en-US" altLang="ko-KR" b="1" kern="0" dirty="0" smtClean="0">
+              <a:solidFill>
+                <a:prstClr val="black">
+                  <a:lumMod val="75000"/>
+                  <a:lumOff val="25000"/>
+                </a:prstClr>
+              </a:solidFill>
+            </a:endParaRPr>
+          </a:p>
+          <a:p>
+            <a:r>
+              <a:rPr lang="ko-KR" altLang="en-US" b="1" kern="0" dirty="0" smtClean="0">
+                <a:solidFill>
+                  <a:prstClr val="black">
+                    <a:lumMod val="75000"/>
+                    <a:lumOff val="25000"/>
+                  </a:prstClr>
+                </a:solidFill>
+              </a:rPr>
+              <a:t>    </a:t>
+            </a:r>
+            <a:endParaRPr lang="en-US" altLang="ko-KR" sz="1200" b="1" kern="0" dirty="0">
+              <a:solidFill>
+                <a:prstClr val="black">
+                  <a:lumMod val="75000"/>
+                  <a:lumOff val="25000"/>
+                </a:prstClr>
+              </a:solidFill>
+            </a:endParaRPr>
+          </a:p>
+        </p:txBody>
+      </p:sp>
       <p:sp>
         <p:nvSpPr>
-          <p:cNvPr id="9" name="TextBox 8"/>
-          <p:cNvSpPr txBox="1"/>
+          <p:cNvPr id="20" name="직사각형 19"/>
+          <p:cNvSpPr/>
           <p:nvPr/>
         </p:nvSpPr>
         <p:spPr>
           <a:xfrm>
-            <a:off x="4256954" y="1609965"/>
-            <a:ext cx="1782695" cy="1785104"/>
+            <a:off x="6128273" y="2812186"/>
+            <a:ext cx="3699192" cy="1661993"/>
           </a:xfrm>
           <a:prstGeom prst="rect">
             <a:avLst/>
           </a:prstGeom>
-          <a:noFill/>
         </p:spPr>
         <p:txBody>
-          <a:bodyPr wrap="square" rtlCol="0">
+          <a:bodyPr wrap="square">
             <a:spAutoFit/>
           </a:bodyPr>
           <a:lstStyle/>
           <a:p>
-            <a:r>
-              <a:rPr lang="ko-KR" altLang="en-US" dirty="0" smtClean="0">
-                <a:solidFill>
-                  <a:srgbClr val="0070C0"/>
-                </a:solidFill>
-                <a:latin typeface="HY견고딕" pitchFamily="18" charset="-127"/>
-                <a:ea typeface="HY견고딕" pitchFamily="18" charset="-127"/>
-              </a:rPr>
-              <a:t>전역일 계산기</a:t>
-            </a:r>
-            <a:endParaRPr lang="en-US" altLang="ko-KR" dirty="0" smtClean="0">
+            <a:endParaRPr lang="en-US" altLang="ko-KR" b="1" kern="0" dirty="0" smtClean="0">
               <a:solidFill>
-                <a:srgbClr val="0070C0"/>
+                <a:prstClr val="black">
+                  <a:lumMod val="75000"/>
+                  <a:lumOff val="25000"/>
+                </a:prstClr>
               </a:solidFill>
-              <a:latin typeface="HY견고딕" pitchFamily="18" charset="-127"/>
-              <a:ea typeface="HY견고딕" pitchFamily="18" charset="-127"/>
             </a:endParaRPr>
           </a:p>
           <a:p>
-            <a:endParaRPr lang="en-US" altLang="ko-KR" dirty="0"/>
-          </a:p>
-          <a:p>
-            <a:r>
-              <a:rPr lang="ko-KR" altLang="en-US" sz="1400" dirty="0" smtClean="0"/>
-              <a:t>총 일</a:t>
-            </a:r>
-            <a:r>
-              <a:rPr lang="en-US" altLang="ko-KR" sz="1400" dirty="0" smtClean="0"/>
-              <a:t>, </a:t>
-            </a:r>
-            <a:r>
-              <a:rPr lang="ko-KR" altLang="en-US" sz="1400" dirty="0" smtClean="0"/>
-              <a:t>한 날</a:t>
-            </a:r>
-            <a:r>
-              <a:rPr lang="en-US" altLang="ko-KR" sz="1400" dirty="0"/>
-              <a:t> </a:t>
-            </a:r>
-            <a:r>
-              <a:rPr lang="ko-KR" altLang="en-US" sz="1400" dirty="0" smtClean="0"/>
-              <a:t>남은 날</a:t>
-            </a:r>
-            <a:r>
-              <a:rPr lang="en-US" altLang="ko-KR" sz="1400" dirty="0" smtClean="0"/>
-              <a:t>, </a:t>
-            </a:r>
-            <a:r>
-              <a:rPr lang="ko-KR" altLang="en-US" sz="1400" dirty="0" smtClean="0"/>
-              <a:t>남은 평일 계산</a:t>
-            </a:r>
-            <a:endParaRPr lang="en-US" altLang="ko-KR" sz="1400" dirty="0" smtClean="0"/>
-          </a:p>
-          <a:p>
-            <a:endParaRPr lang="en-US" altLang="ko-KR" sz="1400" dirty="0"/>
-          </a:p>
-          <a:p>
-            <a:r>
-              <a:rPr lang="ko-KR" altLang="en-US" sz="1400" dirty="0" smtClean="0"/>
-              <a:t>실시간 퍼센트 증가</a:t>
-            </a:r>
-            <a:endParaRPr lang="en-US" altLang="ko-KR" sz="1400" dirty="0" smtClean="0"/>
-          </a:p>
-          <a:p>
-            <a:endParaRPr lang="ko-KR" altLang="en-US" dirty="0"/>
+            <a:r>
+              <a:rPr lang="ko-KR" altLang="en-US" sz="1200" b="1" kern="0" dirty="0" smtClean="0">
+                <a:solidFill>
+                  <a:prstClr val="black">
+                    <a:lumMod val="75000"/>
+                    <a:lumOff val="25000"/>
+                  </a:prstClr>
+                </a:solidFill>
+              </a:rPr>
+              <a:t>화면 </a:t>
+            </a:r>
+            <a:r>
+              <a:rPr lang="ko-KR" altLang="en-US" sz="1200" b="1" kern="0" dirty="0" err="1" smtClean="0">
+                <a:solidFill>
+                  <a:prstClr val="black">
+                    <a:lumMod val="75000"/>
+                    <a:lumOff val="25000"/>
+                  </a:prstClr>
+                </a:solidFill>
+              </a:rPr>
+              <a:t>정의서를</a:t>
+            </a:r>
+            <a:r>
+              <a:rPr lang="ko-KR" altLang="en-US" sz="1200" b="1" kern="0" dirty="0" smtClean="0">
+                <a:solidFill>
+                  <a:prstClr val="black">
+                    <a:lumMod val="75000"/>
+                    <a:lumOff val="25000"/>
+                  </a:prstClr>
+                </a:solidFill>
+              </a:rPr>
+              <a:t> 제출하게 될 줄 몰랐으며</a:t>
+            </a:r>
+            <a:r>
+              <a:rPr lang="en-US" altLang="ko-KR" sz="1200" b="1" kern="0" dirty="0" smtClean="0">
+                <a:solidFill>
+                  <a:prstClr val="black">
+                    <a:lumMod val="75000"/>
+                    <a:lumOff val="25000"/>
+                  </a:prstClr>
+                </a:solidFill>
+              </a:rPr>
+              <a:t>,</a:t>
+            </a:r>
+          </a:p>
+          <a:p>
+            <a:endParaRPr lang="en-US" altLang="ko-KR" sz="1200" b="1" kern="0" dirty="0">
+              <a:solidFill>
+                <a:prstClr val="black">
+                  <a:lumMod val="75000"/>
+                  <a:lumOff val="25000"/>
+                </a:prstClr>
+              </a:solidFill>
+            </a:endParaRPr>
+          </a:p>
+          <a:p>
+            <a:r>
+              <a:rPr lang="ko-KR" altLang="en-US" sz="1200" b="1" kern="0" dirty="0" smtClean="0">
+                <a:solidFill>
+                  <a:prstClr val="black">
+                    <a:lumMod val="75000"/>
+                    <a:lumOff val="25000"/>
+                  </a:prstClr>
+                </a:solidFill>
+              </a:rPr>
+              <a:t>팀이 아닌 개인의 작업이라</a:t>
+            </a:r>
+            <a:endParaRPr lang="en-US" altLang="ko-KR" sz="1200" b="1" kern="0" dirty="0" smtClean="0">
+              <a:solidFill>
+                <a:prstClr val="black">
+                  <a:lumMod val="75000"/>
+                  <a:lumOff val="25000"/>
+                </a:prstClr>
+              </a:solidFill>
+            </a:endParaRPr>
+          </a:p>
+          <a:p>
+            <a:endParaRPr lang="en-US" altLang="ko-KR" sz="1200" b="1" kern="0" dirty="0">
+              <a:solidFill>
+                <a:prstClr val="black">
+                  <a:lumMod val="75000"/>
+                  <a:lumOff val="25000"/>
+                </a:prstClr>
+              </a:solidFill>
+            </a:endParaRPr>
+          </a:p>
+          <a:p>
+            <a:r>
+              <a:rPr lang="ko-KR" altLang="en-US" sz="1200" b="1" kern="0" dirty="0" smtClean="0">
+                <a:solidFill>
+                  <a:prstClr val="black">
+                    <a:lumMod val="75000"/>
+                    <a:lumOff val="25000"/>
+                  </a:prstClr>
+                </a:solidFill>
+              </a:rPr>
+              <a:t>임의로 종이에 작성하였습니다</a:t>
+            </a:r>
+            <a:r>
+              <a:rPr lang="en-US" altLang="ko-KR" sz="1200" b="1" kern="0" dirty="0" smtClean="0">
+                <a:solidFill>
+                  <a:prstClr val="black">
+                    <a:lumMod val="75000"/>
+                    <a:lumOff val="25000"/>
+                  </a:prstClr>
+                </a:solidFill>
+              </a:rPr>
+              <a:t>.</a:t>
+            </a:r>
+          </a:p>
+          <a:p>
+            <a:endParaRPr lang="en-US" altLang="ko-KR" sz="1200" b="1" kern="0" dirty="0">
+              <a:solidFill>
+                <a:prstClr val="black">
+                  <a:lumMod val="75000"/>
+                  <a:lumOff val="25000"/>
+                </a:prstClr>
+              </a:solidFill>
+            </a:endParaRPr>
+          </a:p>
+          <a:p>
+            <a:endParaRPr lang="en-US" altLang="ko-KR" sz="1200" b="1" kern="0" dirty="0">
+              <a:solidFill>
+                <a:prstClr val="black">
+                  <a:lumMod val="75000"/>
+                  <a:lumOff val="25000"/>
+                </a:prstClr>
+              </a:solidFill>
+            </a:endParaRPr>
           </a:p>
         </p:txBody>
       </p:sp>
-      <p:sp>
-        <p:nvSpPr>
-          <p:cNvPr id="21" name="TextBox 20"/>
-          <p:cNvSpPr txBox="1"/>
-          <p:nvPr/>
-        </p:nvSpPr>
-        <p:spPr>
-          <a:xfrm>
-            <a:off x="8827674" y="1609478"/>
-            <a:ext cx="2352595" cy="2215991"/>
-          </a:xfrm>
-          <a:prstGeom prst="rect">
-            <a:avLst/>
-          </a:prstGeom>
-          <a:noFill/>
-        </p:spPr>
-        <p:txBody>
-          <a:bodyPr wrap="square" rtlCol="0">
-            <a:spAutoFit/>
-          </a:bodyPr>
-          <a:lstStyle/>
-          <a:p>
-            <a:r>
-              <a:rPr lang="ko-KR" altLang="en-US" dirty="0" smtClean="0">
-                <a:solidFill>
-                  <a:srgbClr val="0070C0"/>
-                </a:solidFill>
-                <a:latin typeface="HY견고딕" pitchFamily="18" charset="-127"/>
-                <a:ea typeface="HY견고딕" pitchFamily="18" charset="-127"/>
-              </a:rPr>
-              <a:t>달</a:t>
-            </a:r>
-            <a:r>
-              <a:rPr lang="ko-KR" altLang="en-US" dirty="0">
-                <a:solidFill>
-                  <a:srgbClr val="0070C0"/>
-                </a:solidFill>
-                <a:latin typeface="HY견고딕" pitchFamily="18" charset="-127"/>
-                <a:ea typeface="HY견고딕" pitchFamily="18" charset="-127"/>
-              </a:rPr>
-              <a:t>력</a:t>
-            </a:r>
-            <a:endParaRPr lang="en-US" altLang="ko-KR" dirty="0" smtClean="0">
-              <a:solidFill>
-                <a:srgbClr val="0070C0"/>
-              </a:solidFill>
-              <a:latin typeface="HY견고딕" pitchFamily="18" charset="-127"/>
-              <a:ea typeface="HY견고딕" pitchFamily="18" charset="-127"/>
-            </a:endParaRPr>
-          </a:p>
-          <a:p>
-            <a:endParaRPr lang="en-US" altLang="ko-KR" dirty="0"/>
-          </a:p>
-          <a:p>
-            <a:r>
-              <a:rPr lang="ko-KR" altLang="en-US" sz="1400" dirty="0" smtClean="0"/>
-              <a:t>출타 달력</a:t>
-            </a:r>
-            <a:r>
-              <a:rPr lang="en-US" altLang="ko-KR" sz="1400" dirty="0"/>
-              <a:t> </a:t>
-            </a:r>
-            <a:r>
-              <a:rPr lang="ko-KR" altLang="en-US" sz="1400" dirty="0" smtClean="0"/>
-              <a:t>기능</a:t>
-            </a:r>
-            <a:endParaRPr lang="en-US" altLang="ko-KR" sz="1400" dirty="0" smtClean="0"/>
-          </a:p>
-          <a:p>
-            <a:endParaRPr lang="en-US" altLang="ko-KR" sz="1400" dirty="0"/>
-          </a:p>
-          <a:p>
-            <a:r>
-              <a:rPr lang="ko-KR" altLang="en-US" sz="1400" dirty="0" err="1" smtClean="0"/>
-              <a:t>커스텀마이징</a:t>
-            </a:r>
-            <a:r>
-              <a:rPr lang="ko-KR" altLang="en-US" sz="1400" dirty="0" smtClean="0"/>
-              <a:t> 가능</a:t>
-            </a:r>
-            <a:endParaRPr lang="en-US" altLang="ko-KR" sz="1400" dirty="0" smtClean="0"/>
-          </a:p>
-          <a:p>
-            <a:endParaRPr lang="en-US" altLang="ko-KR" sz="1400" dirty="0"/>
-          </a:p>
-          <a:p>
-            <a:r>
-              <a:rPr lang="ko-KR" altLang="en-US" sz="1400" dirty="0" smtClean="0"/>
-              <a:t>다른 사용자의 </a:t>
-            </a:r>
-            <a:endParaRPr lang="en-US" altLang="ko-KR" sz="1400" dirty="0" smtClean="0"/>
-          </a:p>
-          <a:p>
-            <a:r>
-              <a:rPr lang="ko-KR" altLang="en-US" sz="1400" dirty="0" smtClean="0"/>
-              <a:t>출타 달력 확인 가능</a:t>
-            </a:r>
-            <a:endParaRPr lang="en-US" altLang="ko-KR" sz="1400" dirty="0" smtClean="0"/>
-          </a:p>
-          <a:p>
-            <a:endParaRPr lang="ko-KR" altLang="en-US" dirty="0"/>
-          </a:p>
-        </p:txBody>
-      </p:sp>
-      <p:pic>
-        <p:nvPicPr>
-          <p:cNvPr id="1028" name="Picture 4" descr="C:\Users\Admin\Downloads\K-001.png"/>
-          <p:cNvPicPr>
-            <a:picLocks noChangeAspect="1" noChangeArrowheads="1"/>
-          </p:cNvPicPr>
-          <p:nvPr/>
-        </p:nvPicPr>
-        <p:blipFill>
-          <a:blip r:embed="rId4">
-            <a:extLst>
-              <a:ext uri="{28A0092B-C50C-407E-A947-70E740481C1C}">
-                <a14:useLocalDpi xmlns:a14="http://schemas.microsoft.com/office/drawing/2010/main" val="0"/>
-              </a:ext>
-            </a:extLst>
-          </a:blip>
-          <a:srcRect/>
-          <a:stretch>
-            <a:fillRect/>
-          </a:stretch>
-        </p:blipFill>
-        <p:spPr bwMode="auto">
-          <a:xfrm>
-            <a:off x="1682270" y="1624069"/>
-            <a:ext cx="2469696" cy="4402800"/>
-          </a:xfrm>
-          <a:prstGeom prst="rect">
-            <a:avLst/>
-          </a:prstGeom>
-          <a:noFill/>
-          <a:extLst>
-            <a:ext uri="{909E8E84-426E-40DD-AFC4-6F175D3DCCD1}">
-              <a14:hiddenFill xmlns:a14="http://schemas.microsoft.com/office/drawing/2010/main">
-                <a:solidFill>
-                  <a:srgbClr val="FFFFFF"/>
-                </a:solidFill>
-              </a14:hiddenFill>
-            </a:ext>
-          </a:extLst>
-        </p:spPr>
-      </p:pic>
-      <p:pic>
-        <p:nvPicPr>
-          <p:cNvPr id="1029" name="Picture 5" descr="C:\Users\Admin\Downloads\K-003.png"/>
-          <p:cNvPicPr>
-            <a:picLocks noChangeAspect="1" noChangeArrowheads="1"/>
-          </p:cNvPicPr>
-          <p:nvPr/>
-        </p:nvPicPr>
-        <p:blipFill>
-          <a:blip r:embed="rId5">
-            <a:extLst>
-              <a:ext uri="{28A0092B-C50C-407E-A947-70E740481C1C}">
-                <a14:useLocalDpi xmlns:a14="http://schemas.microsoft.com/office/drawing/2010/main" val="0"/>
-              </a:ext>
-            </a:extLst>
-          </a:blip>
-          <a:srcRect/>
-          <a:stretch>
-            <a:fillRect/>
-          </a:stretch>
-        </p:blipFill>
-        <p:spPr bwMode="auto">
-          <a:xfrm>
-            <a:off x="6146742" y="1609478"/>
-            <a:ext cx="2469696" cy="4402800"/>
-          </a:xfrm>
-          <a:prstGeom prst="rect">
-            <a:avLst/>
-          </a:prstGeom>
-          <a:noFill/>
-          <a:extLst>
-            <a:ext uri="{909E8E84-426E-40DD-AFC4-6F175D3DCCD1}">
-              <a14:hiddenFill xmlns:a14="http://schemas.microsoft.com/office/drawing/2010/main">
-                <a:solidFill>
-                  <a:srgbClr val="FFFFFF"/>
-                </a:solidFill>
-              </a14:hiddenFill>
-            </a:ext>
-          </a:extLst>
-        </p:spPr>
-      </p:pic>
     </p:spTree>
     <p:extLst>
       <p:ext uri="{BB962C8B-B14F-4D97-AF65-F5344CB8AC3E}">
-        <p14:creationId xmlns:p14="http://schemas.microsoft.com/office/powerpoint/2010/main" val="1731000196"/>
+        <p14:creationId xmlns:p14="http://schemas.microsoft.com/office/powerpoint/2010/main" val="1850412734"/>
       </p:ext>
     </p:extLst>
   </p:cSld>
@@ -9100,7 +9675,15 @@
                   <a:prstClr val="white"/>
                 </a:solidFill>
               </a:rPr>
-              <a:t>프로젝트 설명</a:t>
+              <a:t>기</a:t>
+            </a:r>
+            <a:r>
+              <a:rPr lang="ko-KR" altLang="en-US" sz="2800" b="1" i="1" dirty="0">
+                <a:solidFill>
+                  <a:prstClr val="white"/>
+                </a:solidFill>
+              </a:rPr>
+              <a:t>능</a:t>
             </a:r>
             <a:endParaRPr lang="en-US" altLang="ko-KR" sz="900" dirty="0">
               <a:solidFill>
@@ -9145,6 +9728,49 @@
           </a:fontRef>
         </p:style>
       </p:cxnSp>
+      <p:sp>
+        <p:nvSpPr>
+          <p:cNvPr id="7" name="직사각형 6"/>
+          <p:cNvSpPr/>
+          <p:nvPr/>
+        </p:nvSpPr>
+        <p:spPr>
+          <a:xfrm>
+            <a:off x="1222793" y="1008280"/>
+            <a:ext cx="1747594" cy="523220"/>
+          </a:xfrm>
+          <a:prstGeom prst="rect">
+            <a:avLst/>
+          </a:prstGeom>
+        </p:spPr>
+        <p:txBody>
+          <a:bodyPr wrap="none">
+            <a:spAutoFit/>
+          </a:bodyPr>
+          <a:lstStyle/>
+          <a:p>
+            <a:r>
+              <a:rPr lang="ko-KR" altLang="en-US" sz="2800" b="1" i="1" kern="0" dirty="0" smtClean="0">
+                <a:solidFill>
+                  <a:prstClr val="black">
+                    <a:lumMod val="75000"/>
+                    <a:lumOff val="25000"/>
+                  </a:prstClr>
+                </a:solidFill>
+              </a:rPr>
+              <a:t>기능 소개</a:t>
+            </a:r>
+            <a:endParaRPr lang="en-US" altLang="ko-KR" sz="2800" b="1" i="1" kern="0" dirty="0">
+              <a:solidFill>
+                <a:prstClr val="black">
+                  <a:lumMod val="75000"/>
+                  <a:lumOff val="25000"/>
+                </a:prstClr>
+              </a:solidFill>
+            </a:endParaRPr>
+          </a:p>
+        </p:txBody>
+      </p:sp>
       <p:pic>
         <p:nvPicPr>
           <p:cNvPr id="4" name="Picture 2" descr="C:\Users\Admin\Downloads\K-002.png"/>
@@ -9236,7 +9862,7 @@
         <p:spPr>
           <a:xfrm>
             <a:off x="4256954" y="1609965"/>
-            <a:ext cx="1782695" cy="3323987"/>
+            <a:ext cx="1782695" cy="1785104"/>
           </a:xfrm>
           <a:prstGeom prst="rect">
             <a:avLst/>
@@ -9257,27 +9883,7 @@
                 <a:latin typeface="HY견고딕" pitchFamily="18" charset="-127"/>
                 <a:ea typeface="HY견고딕" pitchFamily="18" charset="-127"/>
               </a:rPr>
-              <a:t>월</a:t>
-            </a:r>
-            <a:r>
-              <a:rPr lang="ko-KR" altLang="en-US" dirty="0">
-                <a:solidFill>
-                  <a:srgbClr val="0070C0"/>
-                </a:solidFill>
-                <a:latin typeface="HY견고딕" pitchFamily="18" charset="-127"/>
-                <a:ea typeface="HY견고딕" pitchFamily="18" charset="-127"/>
-              </a:rPr>
-              <a:t>급</a:t>
-            </a:r>
-            <a:r>
-              <a:rPr lang="ko-KR" altLang="en-US" dirty="0" smtClean="0">
-                <a:solidFill>
-                  <a:srgbClr val="0070C0"/>
-                </a:solidFill>
-                <a:latin typeface="HY견고딕" pitchFamily="18" charset="-127"/>
-                <a:ea typeface="HY견고딕" pitchFamily="18" charset="-127"/>
-              </a:rPr>
-              <a:t> 계산기</a:t>
+              <a:t>전역일 계산기</a:t>
             </a:r>
             <a:endParaRPr lang="en-US" altLang="ko-KR" dirty="0" smtClean="0">
               <a:solidFill>
@@ -9293,78 +9899,42 @@
           <a:p>
             <a:r>
               <a:rPr lang="ko-KR" altLang="en-US" sz="1400" dirty="0" smtClean="0"/>
-              <a:t>급여 및 저축에</a:t>
+              <a:t>총 일</a:t>
+            </a:r>
+            <a:r>
+              <a:rPr lang="en-US" altLang="ko-KR" sz="1400" dirty="0" smtClean="0"/>
+              <a:t>, </a:t>
+            </a:r>
+            <a:r>
+              <a:rPr lang="ko-KR" altLang="en-US" sz="1400" dirty="0" smtClean="0"/>
+              <a:t>한 날</a:t>
+            </a:r>
+            <a:r>
+              <a:rPr lang="en-US" altLang="ko-KR" sz="1400" dirty="0"/>
+              <a:t> </a:t>
+            </a:r>
+            <a:r>
+              <a:rPr lang="ko-KR" altLang="en-US" sz="1400" dirty="0" smtClean="0"/>
+              <a:t>남은 날</a:t>
+            </a:r>
+            <a:r>
+              <a:rPr lang="en-US" altLang="ko-KR" sz="1400" dirty="0" smtClean="0"/>
+              <a:t>, </a:t>
+            </a:r>
+            <a:r>
+              <a:rPr lang="ko-KR" altLang="en-US" sz="1400" dirty="0" smtClean="0"/>
+              <a:t>남은 평일 계산</a:t>
             </a:r>
             <a:endParaRPr lang="en-US" altLang="ko-KR" sz="1400" dirty="0" smtClean="0"/>
           </a:p>
           <a:p>
+            <a:endParaRPr lang="en-US" altLang="ko-KR" sz="1400" dirty="0"/>
+          </a:p>
+          <a:p>
             <a:r>
               <a:rPr lang="ko-KR" altLang="en-US" sz="1400" dirty="0" smtClean="0"/>
-              <a:t>다양한 정보제공</a:t>
-            </a:r>
-            <a:endParaRPr lang="en-US" altLang="ko-KR" sz="1400" dirty="0" smtClean="0"/>
-          </a:p>
-          <a:p>
-            <a:endParaRPr lang="en-US" altLang="ko-KR" sz="1400" dirty="0"/>
-          </a:p>
-          <a:p>
-            <a:r>
-              <a:rPr lang="ko-KR" altLang="en-US" sz="1400" dirty="0" err="1" smtClean="0"/>
-              <a:t>월적금</a:t>
-            </a:r>
-            <a:r>
-              <a:rPr lang="ko-KR" altLang="en-US" sz="1400" dirty="0" smtClean="0"/>
-              <a:t> 금액 계산</a:t>
-            </a:r>
-            <a:endParaRPr lang="en-US" altLang="ko-KR" sz="1400" dirty="0" smtClean="0"/>
-          </a:p>
-          <a:p>
-            <a:r>
-              <a:rPr lang="en-US" altLang="ko-KR" sz="1400" dirty="0" smtClean="0"/>
-              <a:t>(</a:t>
-            </a:r>
-            <a:r>
-              <a:rPr lang="ko-KR" altLang="en-US" sz="1400" dirty="0" smtClean="0"/>
-              <a:t>장병내일적금</a:t>
-            </a:r>
-            <a:r>
-              <a:rPr lang="en-US" altLang="ko-KR" sz="1400" dirty="0" smtClean="0"/>
-              <a:t>)</a:t>
-            </a:r>
-            <a:r>
-              <a:rPr lang="ko-KR" altLang="en-US" sz="1400" dirty="0" smtClean="0"/>
-              <a:t>등 </a:t>
-            </a:r>
-            <a:endParaRPr lang="en-US" altLang="ko-KR" sz="1400" dirty="0" smtClean="0"/>
-          </a:p>
-          <a:p>
-            <a:r>
-              <a:rPr lang="ko-KR" altLang="en-US" sz="1400" dirty="0" smtClean="0"/>
-              <a:t>계산에 적용가능</a:t>
-            </a:r>
-            <a:endParaRPr lang="en-US" altLang="ko-KR" sz="1400" dirty="0" smtClean="0"/>
-          </a:p>
-          <a:p>
-            <a:endParaRPr lang="en-US" altLang="ko-KR" sz="1400" dirty="0"/>
-          </a:p>
-          <a:p>
-            <a:r>
-              <a:rPr lang="ko-KR" altLang="en-US" sz="1400" dirty="0" smtClean="0"/>
-              <a:t>저축 금액까지의</a:t>
-            </a:r>
-            <a:endParaRPr lang="en-US" altLang="ko-KR" sz="1400" dirty="0" smtClean="0"/>
-          </a:p>
-          <a:p>
-            <a:r>
-              <a:rPr lang="ko-KR" altLang="en-US" sz="1400" dirty="0" smtClean="0"/>
-              <a:t>솔루션 제공</a:t>
-            </a:r>
-            <a:endParaRPr lang="en-US" altLang="ko-KR" sz="1400" dirty="0" smtClean="0"/>
-          </a:p>
-          <a:p>
-            <a:endParaRPr lang="en-US" altLang="ko-KR" sz="1400" dirty="0"/>
-          </a:p>
-          <a:p>
+              <a:t>실시간 퍼센트 증가</a:t>
+            </a:r>
             <a:endParaRPr lang="en-US" altLang="ko-KR" sz="1400" dirty="0" smtClean="0"/>
           </a:p>
           <a:p>
@@ -9381,7 +9951,7 @@
         <p:spPr>
           <a:xfrm>
             <a:off x="8827674" y="1609478"/>
-            <a:ext cx="1782695" cy="2646878"/>
+            <a:ext cx="2352595" cy="2215991"/>
           </a:xfrm>
           <a:prstGeom prst="rect">
             <a:avLst/>
@@ -9402,7 +9972,7 @@
                 <a:latin typeface="HY견고딕" pitchFamily="18" charset="-127"/>
                 <a:ea typeface="HY견고딕" pitchFamily="18" charset="-127"/>
               </a:rPr>
-              <a:t>건</a:t>
+              <a:t>달</a:t>
             </a:r>
             <a:r>
               <a:rPr lang="ko-KR" altLang="en-US" dirty="0">
@@ -9412,17 +9982,7 @@
                 <a:latin typeface="HY견고딕" pitchFamily="18" charset="-127"/>
                 <a:ea typeface="HY견고딕" pitchFamily="18" charset="-127"/>
               </a:rPr>
-              <a:t>강</a:t>
-            </a:r>
-            <a:r>
-              <a:rPr lang="ko-KR" altLang="en-US" dirty="0" smtClean="0">
-                <a:solidFill>
-                  <a:srgbClr val="0070C0"/>
-                </a:solidFill>
-                <a:latin typeface="HY견고딕" pitchFamily="18" charset="-127"/>
-                <a:ea typeface="HY견고딕" pitchFamily="18" charset="-127"/>
-              </a:rPr>
-              <a:t> 기록</a:t>
+              <a:t>력</a:t>
             </a:r>
             <a:endParaRPr lang="en-US" altLang="ko-KR" dirty="0" smtClean="0">
               <a:solidFill>
@@ -9438,7 +9998,15 @@
           <a:p>
             <a:r>
               <a:rPr lang="ko-KR" altLang="en-US" sz="1400" dirty="0" smtClean="0"/>
-              <a:t>차트 제공</a:t>
+              <a:t>출타 달력</a:t>
+            </a:r>
+            <a:r>
+              <a:rPr lang="en-US" altLang="ko-KR" sz="1400" dirty="0"/>
+              <a:t> </a:t>
+            </a:r>
+            <a:r>
+              <a:rPr lang="ko-KR" altLang="en-US" sz="1400" dirty="0" smtClean="0"/>
+              <a:t>기능</a:t>
             </a:r>
             <a:endParaRPr lang="en-US" altLang="ko-KR" sz="1400" dirty="0" smtClean="0"/>
           </a:p>
@@ -9447,39 +10015,29 @@
           </a:p>
           <a:p>
             <a:r>
+              <a:rPr lang="ko-KR" altLang="en-US" sz="1400" dirty="0" err="1" smtClean="0"/>
+              <a:t>커스텀마이징</a:t>
+            </a:r>
+            <a:r>
               <a:rPr lang="ko-KR" altLang="en-US" sz="1400" dirty="0" smtClean="0"/>
-              <a:t>비만도 지수</a:t>
+              <a:t> 가능</a:t>
             </a:r>
             <a:endParaRPr lang="en-US" altLang="ko-KR" sz="1400" dirty="0" smtClean="0"/>
           </a:p>
           <a:p>
+            <a:endParaRPr lang="en-US" altLang="ko-KR" sz="1400" dirty="0"/>
+          </a:p>
+          <a:p>
             <a:r>
               <a:rPr lang="ko-KR" altLang="en-US" sz="1400" dirty="0" smtClean="0"/>
-              <a:t>대사량 정보제공</a:t>
+              <a:t>다른 사용자의 </a:t>
             </a:r>
             <a:endParaRPr lang="en-US" altLang="ko-KR" sz="1400" dirty="0" smtClean="0"/>
           </a:p>
           <a:p>
-            <a:endParaRPr lang="en-US" altLang="ko-KR" sz="1400" dirty="0"/>
-          </a:p>
-          <a:p>
-            <a:r>
-              <a:rPr lang="ko-KR" altLang="en-US" sz="1400" dirty="0"/>
-              <a:t>권장 섭취량</a:t>
-            </a:r>
-            <a:endParaRPr lang="en-US" altLang="ko-KR" sz="1400" dirty="0"/>
-          </a:p>
-          <a:p>
-            <a:r>
-              <a:rPr lang="ko-KR" altLang="en-US" sz="1400" dirty="0"/>
-              <a:t>하루 권장 섭취량</a:t>
-            </a:r>
-            <a:endParaRPr lang="en-US" altLang="ko-KR" sz="1400" dirty="0"/>
-          </a:p>
-          <a:p>
             <a:r>
               <a:rPr lang="ko-KR" altLang="en-US" sz="1400" dirty="0" smtClean="0"/>
-              <a:t>솔루션 제공 </a:t>
+              <a:t>출타 달력 확인 가능</a:t>
             </a:r>
             <a:endParaRPr lang="en-US" altLang="ko-KR" sz="1400" dirty="0" smtClean="0"/>
           </a:p>
@@ -9490,7 +10048,7 @@
       </p:sp>
       <p:pic>
         <p:nvPicPr>
-          <p:cNvPr id="2054" name="Picture 6" descr="C:\Users\Admin\Downloads\K-002.png"/>
+          <p:cNvPr id="1028" name="Picture 4" descr="C:\Users\Admin\Downloads\K-001.png"/>
           <p:cNvPicPr>
             <a:picLocks noChangeAspect="1" noChangeArrowheads="1"/>
           </p:cNvPicPr>
@@ -9511,7 +10069,7 @@
         </p:blipFill>
         <p:spPr bwMode="auto">
           <a:xfrm>
-            <a:off x="1682270" y="1623332"/>
+            <a:off x="1682270" y="1624069"/>
             <a:ext cx="2469696" cy="4402800"/>
           </a:xfrm>
           <a:prstGeom prst="rect">
@@ -9531,7 +10089,7 @@
       </p:pic>
       <p:pic>
         <p:nvPicPr>
-          <p:cNvPr id="2055" name="Picture 7" descr="C:\Users\Admin\Downloads\K-004.png"/>
+          <p:cNvPr id="1029" name="Picture 5" descr="C:\Users\Admin\Downloads\K-003.png"/>
           <p:cNvPicPr>
             <a:picLocks noChangeAspect="1" noChangeArrowheads="1"/>
           </p:cNvPicPr>
@@ -9573,7 +10131,7 @@
     </p:spTree>
     <p:extLst>
       <p:ext uri="{BB962C8B-B14F-4D97-AF65-F5344CB8AC3E}">
-        <p14:creationId xmlns:p14="http://schemas.microsoft.com/office/powerpoint/2010/main" val="856891441"/>
+        <p14:creationId xmlns:p14="http://schemas.microsoft.com/office/powerpoint/2010/main" val="1731000196"/>
       </p:ext>
     </p:extLst>
   </p:cSld>
@@ -10033,15 +10591,7 @@
                   <a:prstClr val="white"/>
                 </a:solidFill>
               </a:rPr>
-              <a:t>기</a:t>
-            </a:r>
-            <a:r>
-              <a:rPr lang="ko-KR" altLang="en-US" sz="2800" b="1" i="1" dirty="0">
-                <a:solidFill>
-                  <a:prstClr val="white"/>
-                </a:solidFill>
-              </a:rPr>
-              <a:t>능</a:t>
+              <a:t>프로젝트 설명</a:t>
             </a:r>
             <a:endParaRPr lang="en-US" altLang="ko-KR" sz="900" dirty="0">
               <a:solidFill>
@@ -10177,7 +10727,7 @@
         <p:spPr>
           <a:xfrm>
             <a:off x="4256954" y="1609965"/>
-            <a:ext cx="1782695" cy="2031325"/>
+            <a:ext cx="1782695" cy="3323987"/>
           </a:xfrm>
           <a:prstGeom prst="rect">
             <a:avLst/>
@@ -10198,7 +10748,7 @@
                 <a:latin typeface="HY견고딕" pitchFamily="18" charset="-127"/>
                 <a:ea typeface="HY견고딕" pitchFamily="18" charset="-127"/>
               </a:rPr>
-              <a:t>체</a:t>
+              <a:t>월</a:t>
             </a:r>
             <a:r>
               <a:rPr lang="ko-KR" altLang="en-US" dirty="0">
@@ -10208,7 +10758,7 @@
                 <a:latin typeface="HY견고딕" pitchFamily="18" charset="-127"/>
                 <a:ea typeface="HY견고딕" pitchFamily="18" charset="-127"/>
               </a:rPr>
-              <a:t>력</a:t>
+              <a:t>급</a:t>
             </a:r>
             <a:r>
               <a:rPr lang="ko-KR" altLang="en-US" dirty="0" smtClean="0">
@@ -10234,14 +10784,14 @@
           <a:p>
             <a:r>
               <a:rPr lang="ko-KR" altLang="en-US" sz="1400" dirty="0" smtClean="0"/>
-              <a:t>국방부 기준</a:t>
+              <a:t>급여 및 저축에</a:t>
             </a:r>
             <a:endParaRPr lang="en-US" altLang="ko-KR" sz="1400" dirty="0" smtClean="0"/>
           </a:p>
           <a:p>
             <a:r>
               <a:rPr lang="ko-KR" altLang="en-US" sz="1400" dirty="0" smtClean="0"/>
-              <a:t>체력 지표 제공</a:t>
+              <a:t>다양한 정보제공</a:t>
             </a:r>
             <a:endParaRPr lang="en-US" altLang="ko-KR" sz="1400" dirty="0" smtClean="0"/>
           </a:p>
@@ -10250,20 +10800,62 @@
           </a:p>
           <a:p>
             <a:r>
+              <a:rPr lang="ko-KR" altLang="en-US" sz="1400" dirty="0" err="1" smtClean="0"/>
+              <a:t>월적금</a:t>
+            </a:r>
+            <a:r>
               <a:rPr lang="ko-KR" altLang="en-US" sz="1400" dirty="0" smtClean="0"/>
-              <a:t>자신의 체력등급</a:t>
+              <a:t> 금액 계산</a:t>
             </a:r>
             <a:endParaRPr lang="en-US" altLang="ko-KR" sz="1400" dirty="0" smtClean="0"/>
           </a:p>
           <a:p>
             <a:r>
+              <a:rPr lang="en-US" altLang="ko-KR" sz="1400" dirty="0" smtClean="0"/>
+              <a:t>(</a:t>
+            </a:r>
+            <a:r>
               <a:rPr lang="ko-KR" altLang="en-US" sz="1400" dirty="0" smtClean="0"/>
-              <a:t>계</a:t>
-            </a:r>
-            <a:r>
-              <a:rPr lang="ko-KR" altLang="en-US" sz="1400" dirty="0"/>
-              <a:t>산</a:t>
-            </a:r>
+              <a:t>장병내일적금</a:t>
+            </a:r>
+            <a:r>
+              <a:rPr lang="en-US" altLang="ko-KR" sz="1400" dirty="0" smtClean="0"/>
+              <a:t>)</a:t>
+            </a:r>
+            <a:r>
+              <a:rPr lang="ko-KR" altLang="en-US" sz="1400" dirty="0" smtClean="0"/>
+              <a:t>등 </a:t>
+            </a:r>
+            <a:endParaRPr lang="en-US" altLang="ko-KR" sz="1400" dirty="0" smtClean="0"/>
+          </a:p>
+          <a:p>
+            <a:r>
+              <a:rPr lang="ko-KR" altLang="en-US" sz="1400" dirty="0" smtClean="0"/>
+              <a:t>계산에 적용가능</a:t>
+            </a:r>
+            <a:endParaRPr lang="en-US" altLang="ko-KR" sz="1400" dirty="0" smtClean="0"/>
+          </a:p>
+          <a:p>
+            <a:endParaRPr lang="en-US" altLang="ko-KR" sz="1400" dirty="0"/>
+          </a:p>
+          <a:p>
+            <a:r>
+              <a:rPr lang="ko-KR" altLang="en-US" sz="1400" dirty="0" smtClean="0"/>
+              <a:t>저축 금액까지의</a:t>
+            </a:r>
+            <a:endParaRPr lang="en-US" altLang="ko-KR" sz="1400" dirty="0" smtClean="0"/>
+          </a:p>
+          <a:p>
+            <a:r>
+              <a:rPr lang="ko-KR" altLang="en-US" sz="1400" dirty="0" smtClean="0"/>
+              <a:t>솔루션 제공</a:t>
+            </a:r>
+            <a:endParaRPr lang="en-US" altLang="ko-KR" sz="1400" dirty="0" smtClean="0"/>
+          </a:p>
+          <a:p>
+            <a:endParaRPr lang="en-US" altLang="ko-KR" sz="1400" dirty="0"/>
+          </a:p>
+          <a:p>
             <a:endParaRPr lang="en-US" altLang="ko-KR" sz="1400" dirty="0" smtClean="0"/>
           </a:p>
           <a:p>
@@ -10280,7 +10872,7 @@
         <p:spPr>
           <a:xfrm>
             <a:off x="8827674" y="1609478"/>
-            <a:ext cx="1782695" cy="2431435"/>
+            <a:ext cx="1782695" cy="2646878"/>
           </a:xfrm>
           <a:prstGeom prst="rect">
             <a:avLst/>
@@ -10301,7 +10893,7 @@
                 <a:latin typeface="HY견고딕" pitchFamily="18" charset="-127"/>
                 <a:ea typeface="HY견고딕" pitchFamily="18" charset="-127"/>
               </a:rPr>
-              <a:t>목</a:t>
+              <a:t>건</a:t>
             </a:r>
             <a:r>
               <a:rPr lang="ko-KR" altLang="en-US" dirty="0">
@@ -10311,7 +10903,17 @@
                 <a:latin typeface="HY견고딕" pitchFamily="18" charset="-127"/>
                 <a:ea typeface="HY견고딕" pitchFamily="18" charset="-127"/>
               </a:rPr>
-              <a:t>표</a:t>
+              <a:t>강</a:t>
+            </a:r>
+            <a:r>
+              <a:rPr lang="ko-KR" altLang="en-US" dirty="0" smtClean="0">
+                <a:solidFill>
+                  <a:srgbClr val="0070C0"/>
+                </a:solidFill>
+                <a:latin typeface="HY견고딕" pitchFamily="18" charset="-127"/>
+                <a:ea typeface="HY견고딕" pitchFamily="18" charset="-127"/>
+              </a:rPr>
+              <a:t> 기록</a:t>
             </a:r>
             <a:endParaRPr lang="en-US" altLang="ko-KR" dirty="0" smtClean="0">
               <a:solidFill>
@@ -10327,7 +10929,7 @@
           <a:p>
             <a:r>
               <a:rPr lang="ko-KR" altLang="en-US" sz="1400" dirty="0" smtClean="0"/>
-              <a:t>군생활 목표 제공</a:t>
+              <a:t>차트 제공</a:t>
             </a:r>
             <a:endParaRPr lang="en-US" altLang="ko-KR" sz="1400" dirty="0" smtClean="0"/>
           </a:p>
@@ -10337,15 +10939,14 @@
           <a:p>
             <a:r>
               <a:rPr lang="ko-KR" altLang="en-US" sz="1400" dirty="0" smtClean="0"/>
-              <a:t>클릭 시 정렬되어 깔끔한 </a:t>
-            </a:r>
-            <a:r>
-              <a:rPr lang="en-US" altLang="ko-KR" sz="1400" dirty="0" smtClean="0"/>
-              <a:t>UI</a:t>
-            </a:r>
+              <a:t>비만도 지수</a:t>
+            </a:r>
+            <a:endParaRPr lang="en-US" altLang="ko-KR" sz="1400" dirty="0" smtClean="0"/>
+          </a:p>
+          <a:p>
             <a:r>
               <a:rPr lang="ko-KR" altLang="en-US" sz="1400" dirty="0" smtClean="0"/>
-              <a:t>추구</a:t>
+              <a:t>대사량 정보제공</a:t>
             </a:r>
             <a:endParaRPr lang="en-US" altLang="ko-KR" sz="1400" dirty="0" smtClean="0"/>
           </a:p>
@@ -10354,19 +10955,22 @@
           </a:p>
           <a:p>
             <a:r>
+              <a:rPr lang="ko-KR" altLang="en-US" sz="1400" dirty="0"/>
+              <a:t>권장 섭취량</a:t>
+            </a:r>
+            <a:endParaRPr lang="en-US" altLang="ko-KR" sz="1400" dirty="0"/>
+          </a:p>
+          <a:p>
+            <a:r>
+              <a:rPr lang="ko-KR" altLang="en-US" sz="1400" dirty="0"/>
+              <a:t>하루 권장 섭취량</a:t>
+            </a:r>
+            <a:endParaRPr lang="en-US" altLang="ko-KR" sz="1400" dirty="0"/>
+          </a:p>
+          <a:p>
+            <a:r>
               <a:rPr lang="ko-KR" altLang="en-US" sz="1400" dirty="0" smtClean="0"/>
-              <a:t>목표 달성 개수</a:t>
-            </a:r>
-            <a:endParaRPr lang="en-US" altLang="ko-KR" sz="1400" dirty="0" smtClean="0"/>
-          </a:p>
-          <a:p>
-            <a:r>
-              <a:rPr lang="ko-KR" altLang="en-US" sz="1400" dirty="0" smtClean="0"/>
-              <a:t>계</a:t>
-            </a:r>
-            <a:r>
-              <a:rPr lang="ko-KR" altLang="en-US" sz="1400" dirty="0"/>
-              <a:t>산</a:t>
+              <a:t>솔루션 제공 </a:t>
             </a:r>
             <a:endParaRPr lang="en-US" altLang="ko-KR" sz="1400" dirty="0" smtClean="0"/>
           </a:p>
@@ -10377,7 +10981,7 @@
       </p:sp>
       <p:pic>
         <p:nvPicPr>
-          <p:cNvPr id="3076" name="Picture 4" descr="C:\Users\Admin\Downloads\K-005.png"/>
+          <p:cNvPr id="2054" name="Picture 6" descr="C:\Users\Admin\Downloads\K-002.png"/>
           <p:cNvPicPr>
             <a:picLocks noChangeAspect="1" noChangeArrowheads="1"/>
           </p:cNvPicPr>
@@ -10398,7 +11002,7 @@
         </p:blipFill>
         <p:spPr bwMode="auto">
           <a:xfrm>
-            <a:off x="1681232" y="1623332"/>
+            <a:off x="1682270" y="1623332"/>
             <a:ext cx="2469696" cy="4402800"/>
           </a:xfrm>
           <a:prstGeom prst="rect">
@@ -10418,7 +11022,7 @@
       </p:pic>
       <p:pic>
         <p:nvPicPr>
-          <p:cNvPr id="3077" name="Picture 5" descr="C:\Users\Admin\Downloads\K-006.png"/>
+          <p:cNvPr id="2055" name="Picture 7" descr="C:\Users\Admin\Downloads\K-004.png"/>
           <p:cNvPicPr>
             <a:picLocks noChangeAspect="1" noChangeArrowheads="1"/>
           </p:cNvPicPr>
@@ -10439,8 +11043,8 @@
         </p:blipFill>
         <p:spPr bwMode="auto">
           <a:xfrm>
-            <a:off x="6146742" y="1623332"/>
-            <a:ext cx="2469695" cy="4402800"/>
+            <a:off x="6146742" y="1609478"/>
+            <a:ext cx="2469696" cy="4402800"/>
           </a:xfrm>
           <a:prstGeom prst="rect">
             <a:avLst/>
@@ -10460,7 +11064,7 @@
     </p:spTree>
     <p:extLst>
       <p:ext uri="{BB962C8B-B14F-4D97-AF65-F5344CB8AC3E}">
-        <p14:creationId xmlns:p14="http://schemas.microsoft.com/office/powerpoint/2010/main" val="1930804918"/>
+        <p14:creationId xmlns:p14="http://schemas.microsoft.com/office/powerpoint/2010/main" val="856891441"/>
       </p:ext>
     </p:extLst>
   </p:cSld>
@@ -10975,7 +11579,7 @@
       </p:cxnSp>
       <p:pic>
         <p:nvPicPr>
-          <p:cNvPr id="4098" name="Picture 2" descr="C:\Users\Admin\Downloads\K-007.png"/>
+          <p:cNvPr id="4" name="Picture 2" descr="C:\Users\Admin\Downloads\K-002.png"/>
           <p:cNvPicPr>
             <a:picLocks noChangeAspect="1" noChangeArrowheads="1"/>
           </p:cNvPicPr>
@@ -10996,8 +11600,8 @@
         </p:blipFill>
         <p:spPr bwMode="auto">
           <a:xfrm>
-            <a:off x="3872268" y="1558067"/>
-            <a:ext cx="2469695" cy="4402800"/>
+            <a:off x="1682270" y="1623332"/>
+            <a:ext cx="2468658" cy="4400950"/>
           </a:xfrm>
           <a:prstGeom prst="rect">
             <a:avLst/>
@@ -11014,16 +11618,57 @@
           </a:extLst>
         </p:spPr>
       </p:pic>
+      <p:pic>
+        <p:nvPicPr>
+          <p:cNvPr id="1027" name="Picture 3" descr="C:\Users\Admin\Downloads\K-005.png"/>
+          <p:cNvPicPr>
+            <a:picLocks noChangeAspect="1" noChangeArrowheads="1"/>
+          </p:cNvPicPr>
+          <p:nvPr/>
+        </p:nvPicPr>
+        <p:blipFill>
+          <a:blip r:embed="rId3">
+            <a:extLst>
+              <a:ext uri="{28A0092B-C50C-407E-A947-70E740481C1C}">
+                <a14:useLocalDpi xmlns:a14="http://schemas.microsoft.com/office/drawing/2010/main" val="0"/>
+              </a:ext>
+            </a:extLst>
+          </a:blip>
+          <a:srcRect/>
+          <a:stretch>
+            <a:fillRect/>
+          </a:stretch>
+        </p:blipFill>
+        <p:spPr bwMode="auto">
+          <a:xfrm>
+            <a:off x="6146742" y="1623332"/>
+            <a:ext cx="2469696" cy="4402800"/>
+          </a:xfrm>
+          <a:prstGeom prst="rect">
+            <a:avLst/>
+          </a:prstGeom>
+          <a:noFill/>
+          <a:extLst>
+            <a:ext uri="{909E8E84-426E-40DD-AFC4-6F175D3DCCD1}">
+              <a14:hiddenFill xmlns:a14="http://schemas.microsoft.com/office/drawing/2010/main">
+                <a:solidFill>
+                  <a:srgbClr val="FFFFFF"/>
+                </a:solidFill>
+              </a14:hiddenFill>
+            </a:ext>
+          </a:extLst>
+        </p:spPr>
+      </p:pic>
       <p:sp>
         <p:nvSpPr>
-          <p:cNvPr id="19" name="TextBox 18"/>
+          <p:cNvPr id="9" name="TextBox 8"/>
           <p:cNvSpPr txBox="1"/>
           <p:nvPr/>
         </p:nvSpPr>
         <p:spPr>
           <a:xfrm>
-            <a:off x="6776038" y="1558066"/>
-            <a:ext cx="2598483" cy="2431435"/>
+            <a:off x="4256954" y="1609965"/>
+            <a:ext cx="1782695" cy="2031325"/>
           </a:xfrm>
           <a:prstGeom prst="rect">
             <a:avLst/>
@@ -11044,7 +11689,27 @@
                 <a:latin typeface="HY견고딕" pitchFamily="18" charset="-127"/>
                 <a:ea typeface="HY견고딕" pitchFamily="18" charset="-127"/>
               </a:rPr>
-              <a:t>커뮤니티</a:t>
+              <a:t>체</a:t>
+            </a:r>
+            <a:r>
+              <a:rPr lang="ko-KR" altLang="en-US" dirty="0">
+                <a:solidFill>
+                  <a:srgbClr val="0070C0"/>
+                </a:solidFill>
+                <a:latin typeface="HY견고딕" pitchFamily="18" charset="-127"/>
+                <a:ea typeface="HY견고딕" pitchFamily="18" charset="-127"/>
+              </a:rPr>
+              <a:t>력</a:t>
+            </a:r>
+            <a:r>
+              <a:rPr lang="ko-KR" altLang="en-US" dirty="0" smtClean="0">
+                <a:solidFill>
+                  <a:srgbClr val="0070C0"/>
+                </a:solidFill>
+                <a:latin typeface="HY견고딕" pitchFamily="18" charset="-127"/>
+                <a:ea typeface="HY견고딕" pitchFamily="18" charset="-127"/>
+              </a:rPr>
+              <a:t> 계산기</a:t>
             </a:r>
             <a:endParaRPr lang="en-US" altLang="ko-KR" dirty="0" smtClean="0">
               <a:solidFill>
@@ -11060,61 +11725,233 @@
           <a:p>
             <a:r>
               <a:rPr lang="ko-KR" altLang="en-US" sz="1400" dirty="0" smtClean="0"/>
-              <a:t>커뮤니티 서비스 제공</a:t>
+              <a:t>국방부 기준</a:t>
             </a:r>
             <a:endParaRPr lang="en-US" altLang="ko-KR" sz="1400" dirty="0" smtClean="0"/>
           </a:p>
           <a:p>
+            <a:r>
+              <a:rPr lang="ko-KR" altLang="en-US" sz="1400" dirty="0" smtClean="0"/>
+              <a:t>체력 지표 제공</a:t>
+            </a:r>
+            <a:endParaRPr lang="en-US" altLang="ko-KR" sz="1400" dirty="0" smtClean="0"/>
+          </a:p>
+          <a:p>
             <a:endParaRPr lang="en-US" altLang="ko-KR" sz="1400" dirty="0"/>
           </a:p>
           <a:p>
             <a:r>
               <a:rPr lang="ko-KR" altLang="en-US" sz="1400" dirty="0" smtClean="0"/>
-              <a:t>하단에 국방부 관련 홍보가능</a:t>
+              <a:t>자신의 체력등급</a:t>
             </a:r>
             <a:endParaRPr lang="en-US" altLang="ko-KR" sz="1400" dirty="0" smtClean="0"/>
           </a:p>
           <a:p>
-            <a:endParaRPr lang="en-US" altLang="ko-KR" sz="1400" dirty="0"/>
-          </a:p>
-          <a:p>
             <a:r>
               <a:rPr lang="ko-KR" altLang="en-US" sz="1400" dirty="0" smtClean="0"/>
-              <a:t>하단에 군인 </a:t>
-            </a:r>
-            <a:r>
-              <a:rPr lang="ko-KR" altLang="en-US" sz="1400" dirty="0" err="1" smtClean="0"/>
-              <a:t>타겟</a:t>
-            </a:r>
-            <a:r>
-              <a:rPr lang="ko-KR" altLang="en-US" sz="1400" dirty="0" smtClean="0"/>
-              <a:t> 광고 게시 가능</a:t>
+              <a:t>계</a:t>
+            </a:r>
+            <a:r>
+              <a:rPr lang="ko-KR" altLang="en-US" sz="1400" dirty="0"/>
+              <a:t>산</a:t>
             </a:r>
             <a:endParaRPr lang="en-US" altLang="ko-KR" sz="1400" dirty="0" smtClean="0"/>
-          </a:p>
-          <a:p>
-            <a:r>
-              <a:rPr lang="en-US" altLang="ko-KR" sz="1400" dirty="0" smtClean="0"/>
-              <a:t>(ex. </a:t>
-            </a:r>
-            <a:r>
-              <a:rPr lang="ko-KR" altLang="en-US" sz="1400" dirty="0" err="1" smtClean="0"/>
-              <a:t>프로틴</a:t>
-            </a:r>
-            <a:r>
-              <a:rPr lang="en-US" altLang="ko-KR" sz="1400" dirty="0" smtClean="0"/>
-              <a:t>)</a:t>
-            </a:r>
           </a:p>
           <a:p>
             <a:endParaRPr lang="ko-KR" altLang="en-US" dirty="0"/>
           </a:p>
         </p:txBody>
       </p:sp>
+      <p:sp>
+        <p:nvSpPr>
+          <p:cNvPr id="21" name="TextBox 20"/>
+          <p:cNvSpPr txBox="1"/>
+          <p:nvPr/>
+        </p:nvSpPr>
+        <p:spPr>
+          <a:xfrm>
+            <a:off x="8827674" y="1609478"/>
+            <a:ext cx="1782695" cy="2431435"/>
+          </a:xfrm>
+          <a:prstGeom prst="rect">
+            <a:avLst/>
+          </a:prstGeom>
+          <a:noFill/>
+        </p:spPr>
+        <p:txBody>
+          <a:bodyPr wrap="square" rtlCol="0">
+            <a:spAutoFit/>
+          </a:bodyPr>
+          <a:lstStyle/>
+          <a:p>
+            <a:r>
+              <a:rPr lang="ko-KR" altLang="en-US" dirty="0" smtClean="0">
+                <a:solidFill>
+                  <a:srgbClr val="0070C0"/>
+                </a:solidFill>
+                <a:latin typeface="HY견고딕" pitchFamily="18" charset="-127"/>
+                <a:ea typeface="HY견고딕" pitchFamily="18" charset="-127"/>
+              </a:rPr>
+              <a:t>목</a:t>
+            </a:r>
+            <a:r>
+              <a:rPr lang="ko-KR" altLang="en-US" dirty="0">
+                <a:solidFill>
+                  <a:srgbClr val="0070C0"/>
+                </a:solidFill>
+                <a:latin typeface="HY견고딕" pitchFamily="18" charset="-127"/>
+                <a:ea typeface="HY견고딕" pitchFamily="18" charset="-127"/>
+              </a:rPr>
+              <a:t>표</a:t>
+            </a:r>
+            <a:endParaRPr lang="en-US" altLang="ko-KR" dirty="0" smtClean="0">
+              <a:solidFill>
+                <a:srgbClr val="0070C0"/>
+              </a:solidFill>
+              <a:latin typeface="HY견고딕" pitchFamily="18" charset="-127"/>
+              <a:ea typeface="HY견고딕" pitchFamily="18" charset="-127"/>
+            </a:endParaRPr>
+          </a:p>
+          <a:p>
+            <a:endParaRPr lang="en-US" altLang="ko-KR" dirty="0"/>
+          </a:p>
+          <a:p>
+            <a:r>
+              <a:rPr lang="ko-KR" altLang="en-US" sz="1400" dirty="0" smtClean="0"/>
+              <a:t>군생활 목표 제공</a:t>
+            </a:r>
+            <a:endParaRPr lang="en-US" altLang="ko-KR" sz="1400" dirty="0" smtClean="0"/>
+          </a:p>
+          <a:p>
+            <a:endParaRPr lang="en-US" altLang="ko-KR" sz="1400" dirty="0"/>
+          </a:p>
+          <a:p>
+            <a:r>
+              <a:rPr lang="ko-KR" altLang="en-US" sz="1400" dirty="0" smtClean="0"/>
+              <a:t>클릭 시 정렬되어 깔끔한 </a:t>
+            </a:r>
+            <a:r>
+              <a:rPr lang="en-US" altLang="ko-KR" sz="1400" dirty="0" smtClean="0"/>
+              <a:t>UI</a:t>
+            </a:r>
+            <a:r>
+              <a:rPr lang="ko-KR" altLang="en-US" sz="1400" dirty="0" smtClean="0"/>
+              <a:t>추구</a:t>
+            </a:r>
+            <a:endParaRPr lang="en-US" altLang="ko-KR" sz="1400" dirty="0" smtClean="0"/>
+          </a:p>
+          <a:p>
+            <a:endParaRPr lang="en-US" altLang="ko-KR" sz="1400" dirty="0"/>
+          </a:p>
+          <a:p>
+            <a:r>
+              <a:rPr lang="ko-KR" altLang="en-US" sz="1400" dirty="0" smtClean="0"/>
+              <a:t>목표 달성 개수</a:t>
+            </a:r>
+            <a:endParaRPr lang="en-US" altLang="ko-KR" sz="1400" dirty="0" smtClean="0"/>
+          </a:p>
+          <a:p>
+            <a:r>
+              <a:rPr lang="ko-KR" altLang="en-US" sz="1400" dirty="0" smtClean="0"/>
+              <a:t>계</a:t>
+            </a:r>
+            <a:r>
+              <a:rPr lang="ko-KR" altLang="en-US" sz="1400" dirty="0"/>
+              <a:t>산</a:t>
+            </a:r>
+            <a:endParaRPr lang="en-US" altLang="ko-KR" sz="1400" dirty="0" smtClean="0"/>
+          </a:p>
+          <a:p>
+            <a:endParaRPr lang="ko-KR" altLang="en-US" dirty="0"/>
+          </a:p>
+        </p:txBody>
+      </p:sp>
+      <p:pic>
+        <p:nvPicPr>
+          <p:cNvPr id="3076" name="Picture 4" descr="C:\Users\Admin\Downloads\K-005.png"/>
+          <p:cNvPicPr>
+            <a:picLocks noChangeAspect="1" noChangeArrowheads="1"/>
+          </p:cNvPicPr>
+          <p:nvPr/>
+        </p:nvPicPr>
+        <p:blipFill>
+          <a:blip r:embed="rId4">
+            <a:extLst>
+              <a:ext uri="{28A0092B-C50C-407E-A947-70E740481C1C}">
+                <a14:useLocalDpi xmlns:a14="http://schemas.microsoft.com/office/drawing/2010/main" val="0"/>
+              </a:ext>
+            </a:extLst>
+          </a:blip>
+          <a:srcRect/>
+          <a:stretch>
+            <a:fillRect/>
+          </a:stretch>
+        </p:blipFill>
+        <p:spPr bwMode="auto">
+          <a:xfrm>
+            <a:off x="1681232" y="1623332"/>
+            <a:ext cx="2469696" cy="4402800"/>
+          </a:xfrm>
+          <a:prstGeom prst="rect">
+            <a:avLst/>
+          </a:prstGeom>
+          <a:noFill/>
+          <a:extLst>
+            <a:ext uri="{909E8E84-426E-40DD-AFC4-6F175D3DCCD1}">
+              <a14:hiddenFill xmlns:a14="http://schemas.microsoft.com/office/drawing/2010/main">
+                <a:solidFill>
+                  <a:srgbClr val="FFFFFF"/>
+                </a:solidFill>
+              </a14:hiddenFill>
+            </a:ext>
+          </a:extLst>
+        </p:spPr>
+      </p:pic>
+      <p:pic>
+        <p:nvPicPr>
+          <p:cNvPr id="3077" name="Picture 5" descr="C:\Users\Admin\Downloads\K-006.png"/>
+          <p:cNvPicPr>
+            <a:picLocks noChangeAspect="1" noChangeArrowheads="1"/>
+          </p:cNvPicPr>
+          <p:nvPr/>
+        </p:nvPicPr>
+        <p:blipFill>
+          <a:blip r:embed="rId5">
+            <a:extLst>
+              <a:ext uri="{28A0092B-C50C-407E-A947-70E740481C1C}">
+                <a14:useLocalDpi xmlns:a14="http://schemas.microsoft.com/office/drawing/2010/main" val="0"/>
+              </a:ext>
+            </a:extLst>
+          </a:blip>
+          <a:srcRect/>
+          <a:stretch>
+            <a:fillRect/>
+          </a:stretch>
+        </p:blipFill>
+        <p:spPr bwMode="auto">
+          <a:xfrm>
+            <a:off x="6146742" y="1623332"/>
+            <a:ext cx="2469695" cy="4402800"/>
+          </a:xfrm>
+          <a:prstGeom prst="rect">
+            <a:avLst/>
+          </a:prstGeom>
+          <a:noFill/>
+          <a:extLst>
+            <a:ext uri="{909E8E84-426E-40DD-AFC4-6F175D3DCCD1}">
+              <a14:hiddenFill xmlns:a14="http://schemas.microsoft.com/office/drawing/2010/main">
+                <a:solidFill>
+                  <a:srgbClr val="FFFFFF"/>
+                </a:solidFill>
+              </a14:hiddenFill>
+            </a:ext>
+          </a:extLst>
+        </p:spPr>
+      </p:pic>
     </p:spTree>
     <p:extLst>
       <p:ext uri="{BB962C8B-B14F-4D97-AF65-F5344CB8AC3E}">
-        <p14:creationId xmlns:p14="http://schemas.microsoft.com/office/powerpoint/2010/main" val="2606090462"/>
+        <p14:creationId xmlns:p14="http://schemas.microsoft.com/office/powerpoint/2010/main" val="1930804918"/>
       </p:ext>
     </p:extLst>
   </p:cSld>
@@ -11547,6 +12384,51 @@
           </a:fontRef>
         </p:style>
       </p:cxnSp>
+      <p:sp>
+        <p:nvSpPr>
+          <p:cNvPr id="11" name="직사각형 10"/>
+          <p:cNvSpPr/>
+          <p:nvPr/>
+        </p:nvSpPr>
+        <p:spPr>
+          <a:xfrm>
+            <a:off x="2466020" y="139700"/>
+            <a:ext cx="7361445" cy="523220"/>
+          </a:xfrm>
+          <a:prstGeom prst="rect">
+            <a:avLst/>
+          </a:prstGeom>
+        </p:spPr>
+        <p:txBody>
+          <a:bodyPr wrap="square">
+            <a:spAutoFit/>
+          </a:bodyPr>
+          <a:lstStyle/>
+          <a:p>
+            <a:r>
+              <a:rPr lang="ko-KR" altLang="en-US" sz="2800" b="1" i="1" dirty="0" smtClean="0">
+                <a:solidFill>
+                  <a:prstClr val="white"/>
+                </a:solidFill>
+              </a:rPr>
+              <a:t>기</a:t>
+            </a:r>
+            <a:r>
+              <a:rPr lang="ko-KR" altLang="en-US" sz="2800" b="1" i="1" dirty="0">
+                <a:solidFill>
+                  <a:prstClr val="white"/>
+                </a:solidFill>
+              </a:rPr>
+              <a:t>능</a:t>
+            </a:r>
+            <a:endParaRPr lang="en-US" altLang="ko-KR" sz="900" dirty="0">
+              <a:solidFill>
+                <a:prstClr val="white"/>
+              </a:solidFill>
+            </a:endParaRPr>
+          </a:p>
+        </p:txBody>
+      </p:sp>
       <p:cxnSp>
         <p:nvCxnSpPr>
           <p:cNvPr id="12" name="직선 연결선 11"/>
@@ -11582,63 +12464,9 @@
           </a:fontRef>
         </p:style>
       </p:cxnSp>
-      <p:sp>
-        <p:nvSpPr>
-          <p:cNvPr id="22" name="직사각형 21"/>
-          <p:cNvSpPr/>
-          <p:nvPr/>
-        </p:nvSpPr>
-        <p:spPr>
-          <a:xfrm>
-            <a:off x="661248" y="4546755"/>
-            <a:ext cx="11201514" cy="769441"/>
-          </a:xfrm>
-          <a:prstGeom prst="rect">
-            <a:avLst/>
-          </a:prstGeom>
-        </p:spPr>
-        <p:txBody>
-          <a:bodyPr wrap="square">
-            <a:spAutoFit/>
-          </a:bodyPr>
-          <a:lstStyle/>
-          <a:p>
-            <a:pPr algn="ctr"/>
-            <a:r>
-              <a:rPr lang="ko-KR" altLang="en-US" sz="3200" b="1" kern="0" dirty="0" smtClean="0">
-                <a:solidFill>
-                  <a:prstClr val="black">
-                    <a:lumMod val="75000"/>
-                    <a:lumOff val="25000"/>
-                  </a:prstClr>
-                </a:solidFill>
-              </a:rPr>
-              <a:t>감사합니다</a:t>
-            </a:r>
-            <a:endParaRPr lang="en-US" altLang="ko-KR" sz="3200" b="1" kern="0" dirty="0">
-              <a:solidFill>
-                <a:prstClr val="black">
-                  <a:lumMod val="75000"/>
-                  <a:lumOff val="25000"/>
-                </a:prstClr>
-              </a:solidFill>
-            </a:endParaRPr>
-          </a:p>
-          <a:p>
-            <a:endParaRPr lang="en-US" altLang="ko-KR" sz="1200" b="1" kern="0" dirty="0">
-              <a:solidFill>
-                <a:prstClr val="black">
-                  <a:lumMod val="75000"/>
-                  <a:lumOff val="25000"/>
-                </a:prstClr>
-              </a:solidFill>
-            </a:endParaRPr>
-          </a:p>
-        </p:txBody>
-      </p:sp>
       <p:pic>
         <p:nvPicPr>
-          <p:cNvPr id="2050" name="Picture 2" descr="무지 꾸벅에 대한 이미지 검색결과"/>
+          <p:cNvPr id="4098" name="Picture 2" descr="C:\Users\Admin\Downloads\K-007.png"/>
           <p:cNvPicPr>
             <a:picLocks noChangeAspect="1" noChangeArrowheads="1"/>
           </p:cNvPicPr>
@@ -11659,8 +12487,8 @@
         </p:blipFill>
         <p:spPr bwMode="auto">
           <a:xfrm>
-            <a:off x="4622744" y="1754052"/>
-            <a:ext cx="3048000" cy="2495551"/>
+            <a:off x="3872268" y="1558067"/>
+            <a:ext cx="2469695" cy="4402800"/>
           </a:xfrm>
           <a:prstGeom prst="rect">
             <a:avLst/>
@@ -11677,10 +12505,107 @@
           </a:extLst>
         </p:spPr>
       </p:pic>
+      <p:sp>
+        <p:nvSpPr>
+          <p:cNvPr id="19" name="TextBox 18"/>
+          <p:cNvSpPr txBox="1"/>
+          <p:nvPr/>
+        </p:nvSpPr>
+        <p:spPr>
+          <a:xfrm>
+            <a:off x="6776038" y="1558066"/>
+            <a:ext cx="2598483" cy="2431435"/>
+          </a:xfrm>
+          <a:prstGeom prst="rect">
+            <a:avLst/>
+          </a:prstGeom>
+          <a:noFill/>
+        </p:spPr>
+        <p:txBody>
+          <a:bodyPr wrap="square" rtlCol="0">
+            <a:spAutoFit/>
+          </a:bodyPr>
+          <a:lstStyle/>
+          <a:p>
+            <a:r>
+              <a:rPr lang="ko-KR" altLang="en-US" dirty="0" smtClean="0">
+                <a:solidFill>
+                  <a:srgbClr val="0070C0"/>
+                </a:solidFill>
+                <a:latin typeface="HY견고딕" pitchFamily="18" charset="-127"/>
+                <a:ea typeface="HY견고딕" pitchFamily="18" charset="-127"/>
+              </a:rPr>
+              <a:t>커뮤니티</a:t>
+            </a:r>
+            <a:endParaRPr lang="en-US" altLang="ko-KR" dirty="0" smtClean="0">
+              <a:solidFill>
+                <a:srgbClr val="0070C0"/>
+              </a:solidFill>
+              <a:latin typeface="HY견고딕" pitchFamily="18" charset="-127"/>
+              <a:ea typeface="HY견고딕" pitchFamily="18" charset="-127"/>
+            </a:endParaRPr>
+          </a:p>
+          <a:p>
+            <a:endParaRPr lang="en-US" altLang="ko-KR" dirty="0"/>
+          </a:p>
+          <a:p>
+            <a:r>
+              <a:rPr lang="ko-KR" altLang="en-US" sz="1400" dirty="0" smtClean="0"/>
+              <a:t>커뮤니티 서비스 제공</a:t>
+            </a:r>
+            <a:endParaRPr lang="en-US" altLang="ko-KR" sz="1400" dirty="0" smtClean="0"/>
+          </a:p>
+          <a:p>
+            <a:endParaRPr lang="en-US" altLang="ko-KR" sz="1400" dirty="0"/>
+          </a:p>
+          <a:p>
+            <a:r>
+              <a:rPr lang="ko-KR" altLang="en-US" sz="1400" dirty="0" smtClean="0"/>
+              <a:t>하단에 국방부 관련 홍보가능</a:t>
+            </a:r>
+            <a:endParaRPr lang="en-US" altLang="ko-KR" sz="1400" dirty="0" smtClean="0"/>
+          </a:p>
+          <a:p>
+            <a:endParaRPr lang="en-US" altLang="ko-KR" sz="1400" dirty="0"/>
+          </a:p>
+          <a:p>
+            <a:r>
+              <a:rPr lang="ko-KR" altLang="en-US" sz="1400" dirty="0" smtClean="0"/>
+              <a:t>하단에 군인 </a:t>
+            </a:r>
+            <a:r>
+              <a:rPr lang="ko-KR" altLang="en-US" sz="1400" dirty="0" err="1" smtClean="0"/>
+              <a:t>타겟</a:t>
+            </a:r>
+            <a:r>
+              <a:rPr lang="ko-KR" altLang="en-US" sz="1400" dirty="0" smtClean="0"/>
+              <a:t> 광고 게시 가능</a:t>
+            </a:r>
+            <a:endParaRPr lang="en-US" altLang="ko-KR" sz="1400" dirty="0" smtClean="0"/>
+          </a:p>
+          <a:p>
+            <a:r>
+              <a:rPr lang="en-US" altLang="ko-KR" sz="1400" dirty="0" smtClean="0"/>
+              <a:t>(ex. </a:t>
+            </a:r>
+            <a:r>
+              <a:rPr lang="ko-KR" altLang="en-US" sz="1400" dirty="0" err="1" smtClean="0"/>
+              <a:t>프로틴</a:t>
+            </a:r>
+            <a:r>
+              <a:rPr lang="en-US" altLang="ko-KR" sz="1400" dirty="0" smtClean="0"/>
+              <a:t>)</a:t>
+            </a:r>
+          </a:p>
+          <a:p>
+            <a:endParaRPr lang="ko-KR" altLang="en-US" dirty="0"/>
+          </a:p>
+        </p:txBody>
+      </p:sp>
     </p:spTree>
     <p:extLst>
       <p:ext uri="{BB962C8B-B14F-4D97-AF65-F5344CB8AC3E}">
-        <p14:creationId xmlns:p14="http://schemas.microsoft.com/office/powerpoint/2010/main" val="3767119247"/>
+        <p14:creationId xmlns:p14="http://schemas.microsoft.com/office/powerpoint/2010/main" val="2606090462"/>
       </p:ext>
     </p:extLst>
   </p:cSld>
@@ -11955,7 +12880,7 @@
   <a:extraClrSchemeLst/>
   <a:extLst>
     <a:ext uri="{05A4C25C-085E-4340-85A3-A5531E510DB2}">
-      <thm15:themeFamily xmlns:thm15="http://schemas.microsoft.com/office/thememl/2012/main" xmlns="" name="Office Theme" id="{62F939B6-93AF-4DB8-9C6B-D6C7DFDC589F}" vid="{4A3C46E8-61CC-4603-A589-7422A47A8E4A}"/>
+      <thm15:themeFamily xmlns="" xmlns:thm15="http://schemas.microsoft.com/office/thememl/2012/main" name="Office Theme" id="{62F939B6-93AF-4DB8-9C6B-D6C7DFDC589F}" vid="{4A3C46E8-61CC-4603-A589-7422A47A8E4A}"/>
     </a:ext>
   </a:extLst>
 </a:theme>

</xml_diff>